<commit_message>
Added Python script to compute average distance between 2 points
</commit_message>
<xml_diff>
--- a/nne_distribution/Presentation1.pptx
+++ b/nne_distribution/Presentation1.pptx
@@ -8,6 +8,7 @@
     <p:sldId id="256" r:id="rId2"/>
     <p:sldId id="257" r:id="rId3"/>
     <p:sldId id="258" r:id="rId4"/>
+    <p:sldId id="259" r:id="rId5"/>
   </p:sldIdLst>
   <p:sldSz cx="12192000" cy="6858000"/>
   <p:notesSz cx="6858000" cy="9144000"/>
@@ -106,6 +107,11 @@
       </a:defRPr>
     </a:lvl9pPr>
   </p:defaultTextStyle>
+  <p:extLst>
+    <p:ext uri="{EFAFB233-063F-42B5-8137-9DF3F51BA10A}">
+      <p15:sldGuideLst xmlns:p15="http://schemas.microsoft.com/office/powerpoint/2012/main"/>
+    </p:ext>
+  </p:extLst>
 </p:presentation>
 </file>
 
@@ -258,7 +264,7 @@
           <a:p>
             <a:fld id="{9FFF5BFD-EF5D-4C0F-9B46-C2E2A77944BE}" type="datetimeFigureOut">
               <a:rPr lang="en-GB" smtClean="0"/>
-              <a:t>01/04/2021</a:t>
+              <a:t>02/04/2021</a:t>
             </a:fld>
             <a:endParaRPr lang="en-GB"/>
           </a:p>
@@ -458,7 +464,7 @@
           <a:p>
             <a:fld id="{9FFF5BFD-EF5D-4C0F-9B46-C2E2A77944BE}" type="datetimeFigureOut">
               <a:rPr lang="en-GB" smtClean="0"/>
-              <a:t>01/04/2021</a:t>
+              <a:t>02/04/2021</a:t>
             </a:fld>
             <a:endParaRPr lang="en-GB"/>
           </a:p>
@@ -668,7 +674,7 @@
           <a:p>
             <a:fld id="{9FFF5BFD-EF5D-4C0F-9B46-C2E2A77944BE}" type="datetimeFigureOut">
               <a:rPr lang="en-GB" smtClean="0"/>
-              <a:t>01/04/2021</a:t>
+              <a:t>02/04/2021</a:t>
             </a:fld>
             <a:endParaRPr lang="en-GB"/>
           </a:p>
@@ -868,7 +874,7 @@
           <a:p>
             <a:fld id="{9FFF5BFD-EF5D-4C0F-9B46-C2E2A77944BE}" type="datetimeFigureOut">
               <a:rPr lang="en-GB" smtClean="0"/>
-              <a:t>01/04/2021</a:t>
+              <a:t>02/04/2021</a:t>
             </a:fld>
             <a:endParaRPr lang="en-GB"/>
           </a:p>
@@ -1144,7 +1150,7 @@
           <a:p>
             <a:fld id="{9FFF5BFD-EF5D-4C0F-9B46-C2E2A77944BE}" type="datetimeFigureOut">
               <a:rPr lang="en-GB" smtClean="0"/>
-              <a:t>01/04/2021</a:t>
+              <a:t>02/04/2021</a:t>
             </a:fld>
             <a:endParaRPr lang="en-GB"/>
           </a:p>
@@ -1412,7 +1418,7 @@
           <a:p>
             <a:fld id="{9FFF5BFD-EF5D-4C0F-9B46-C2E2A77944BE}" type="datetimeFigureOut">
               <a:rPr lang="en-GB" smtClean="0"/>
-              <a:t>01/04/2021</a:t>
+              <a:t>02/04/2021</a:t>
             </a:fld>
             <a:endParaRPr lang="en-GB"/>
           </a:p>
@@ -1827,7 +1833,7 @@
           <a:p>
             <a:fld id="{9FFF5BFD-EF5D-4C0F-9B46-C2E2A77944BE}" type="datetimeFigureOut">
               <a:rPr lang="en-GB" smtClean="0"/>
-              <a:t>01/04/2021</a:t>
+              <a:t>02/04/2021</a:t>
             </a:fld>
             <a:endParaRPr lang="en-GB"/>
           </a:p>
@@ -1969,7 +1975,7 @@
           <a:p>
             <a:fld id="{9FFF5BFD-EF5D-4C0F-9B46-C2E2A77944BE}" type="datetimeFigureOut">
               <a:rPr lang="en-GB" smtClean="0"/>
-              <a:t>01/04/2021</a:t>
+              <a:t>02/04/2021</a:t>
             </a:fld>
             <a:endParaRPr lang="en-GB"/>
           </a:p>
@@ -2082,7 +2088,7 @@
           <a:p>
             <a:fld id="{9FFF5BFD-EF5D-4C0F-9B46-C2E2A77944BE}" type="datetimeFigureOut">
               <a:rPr lang="en-GB" smtClean="0"/>
-              <a:t>01/04/2021</a:t>
+              <a:t>02/04/2021</a:t>
             </a:fld>
             <a:endParaRPr lang="en-GB"/>
           </a:p>
@@ -2395,7 +2401,7 @@
           <a:p>
             <a:fld id="{9FFF5BFD-EF5D-4C0F-9B46-C2E2A77944BE}" type="datetimeFigureOut">
               <a:rPr lang="en-GB" smtClean="0"/>
-              <a:t>01/04/2021</a:t>
+              <a:t>02/04/2021</a:t>
             </a:fld>
             <a:endParaRPr lang="en-GB"/>
           </a:p>
@@ -2684,7 +2690,7 @@
           <a:p>
             <a:fld id="{9FFF5BFD-EF5D-4C0F-9B46-C2E2A77944BE}" type="datetimeFigureOut">
               <a:rPr lang="en-GB" smtClean="0"/>
-              <a:t>01/04/2021</a:t>
+              <a:t>02/04/2021</a:t>
             </a:fld>
             <a:endParaRPr lang="en-GB"/>
           </a:p>
@@ -2927,7 +2933,7 @@
           <a:p>
             <a:fld id="{9FFF5BFD-EF5D-4C0F-9B46-C2E2A77944BE}" type="datetimeFigureOut">
               <a:rPr lang="en-GB" smtClean="0"/>
-              <a:t>01/04/2021</a:t>
+              <a:t>02/04/2021</a:t>
             </a:fld>
             <a:endParaRPr lang="en-GB"/>
           </a:p>
@@ -3926,8 +3932,8 @@
           <a:chExt cx="0" cy="0"/>
         </a:xfrm>
       </p:grpSpPr>
-      <mc:AlternateContent xmlns:mc="http://schemas.openxmlformats.org/markup-compatibility/2006">
-        <mc:Choice xmlns:a14="http://schemas.microsoft.com/office/drawing/2010/main" Requires="a14">
+      <mc:AlternateContent xmlns:mc="http://schemas.openxmlformats.org/markup-compatibility/2006" xmlns:a14="http://schemas.microsoft.com/office/drawing/2010/main">
+        <mc:Choice Requires="a14">
           <p:sp>
             <p:nvSpPr>
               <p:cNvPr id="2" name="TextBox 1">
@@ -3956,6 +3962,7 @@
               </a:bodyPr>
               <a:lstStyle/>
               <a:p>
+                <a:pPr/>
                 <a14:m>
                   <m:oMathPara xmlns:m="http://schemas.openxmlformats.org/officeDocument/2006/math">
                     <m:oMathParaPr>
@@ -4120,13 +4127,7 @@
                                 <a:rPr lang="en-GB" b="0" i="1" smtClean="0">
                                   <a:latin typeface="Cambria Math" panose="02040503050406030204" pitchFamily="18" charset="0"/>
                                 </a:rPr>
-                                <m:t>3</m:t>
-                              </m:r>
-                              <m:r>
-                                <a:rPr lang="en-GB" b="0" i="1" smtClean="0">
-                                  <a:latin typeface="Cambria Math" panose="02040503050406030204" pitchFamily="18" charset="0"/>
-                                </a:rPr>
-                                <m:t>4</m:t>
+                                <m:t>34</m:t>
                               </m:r>
                             </m:sub>
                           </m:sSub>
@@ -4163,13 +4164,7 @@
                                 <a:rPr lang="en-GB" b="0" i="1" smtClean="0">
                                   <a:latin typeface="Cambria Math" panose="02040503050406030204" pitchFamily="18" charset="0"/>
                                 </a:rPr>
-                                <m:t>5</m:t>
-                              </m:r>
-                              <m:r>
-                                <a:rPr lang="en-GB" b="0" i="1" smtClean="0">
-                                  <a:latin typeface="Cambria Math" panose="02040503050406030204" pitchFamily="18" charset="0"/>
-                                </a:rPr>
-                                <m:t>4</m:t>
+                                <m:t>54</m:t>
                               </m:r>
                             </m:sub>
                           </m:sSub>
@@ -4191,7 +4186,7 @@
             </p:txBody>
           </p:sp>
         </mc:Choice>
-        <mc:Fallback>
+        <mc:Fallback xmlns="">
           <p:sp>
             <p:nvSpPr>
               <p:cNvPr id="2" name="TextBox 1">
@@ -4240,6 +4235,334 @@
     <p:extLst>
       <p:ext uri="{BB962C8B-B14F-4D97-AF65-F5344CB8AC3E}">
         <p14:creationId xmlns:p14="http://schemas.microsoft.com/office/powerpoint/2010/main" val="964738566"/>
+      </p:ext>
+    </p:extLst>
+  </p:cSld>
+  <p:clrMapOvr>
+    <a:masterClrMapping/>
+  </p:clrMapOvr>
+</p:sld>
+</file>
+
+<file path=ppt/slides/slide4.xml><?xml version="1.0" encoding="utf-8"?>
+<p:sld xmlns:a="http://schemas.openxmlformats.org/drawingml/2006/main" xmlns:r="http://schemas.openxmlformats.org/officeDocument/2006/relationships" xmlns:p="http://schemas.openxmlformats.org/presentationml/2006/main">
+  <p:cSld>
+    <p:spTree>
+      <p:nvGrpSpPr>
+        <p:cNvPr id="1" name=""/>
+        <p:cNvGrpSpPr/>
+        <p:nvPr/>
+      </p:nvGrpSpPr>
+      <p:grpSpPr>
+        <a:xfrm>
+          <a:off x="0" y="0"/>
+          <a:ext cx="0" cy="0"/>
+          <a:chOff x="0" y="0"/>
+          <a:chExt cx="0" cy="0"/>
+        </a:xfrm>
+      </p:grpSpPr>
+      <p:cxnSp>
+        <p:nvCxnSpPr>
+          <p:cNvPr id="3" name="Straight Arrow Connector 2">
+            <a:extLst>
+              <a:ext uri="{FF2B5EF4-FFF2-40B4-BE49-F238E27FC236}">
+                <a16:creationId xmlns:a16="http://schemas.microsoft.com/office/drawing/2014/main" id="{09911CD1-AB57-41D5-B5B7-A065353FE329}"/>
+              </a:ext>
+            </a:extLst>
+          </p:cNvPr>
+          <p:cNvCxnSpPr>
+            <a:cxnSpLocks/>
+          </p:cNvCxnSpPr>
+          <p:nvPr/>
+        </p:nvCxnSpPr>
+        <p:spPr>
+          <a:xfrm>
+            <a:off x="1803633" y="4874004"/>
+            <a:ext cx="3624044" cy="0"/>
+          </a:xfrm>
+          <a:prstGeom prst="straightConnector1">
+            <a:avLst/>
+          </a:prstGeom>
+          <a:ln>
+            <a:tailEnd type="triangle"/>
+          </a:ln>
+        </p:spPr>
+        <p:style>
+          <a:lnRef idx="1">
+            <a:schemeClr val="accent1"/>
+          </a:lnRef>
+          <a:fillRef idx="0">
+            <a:schemeClr val="accent1"/>
+          </a:fillRef>
+          <a:effectRef idx="0">
+            <a:schemeClr val="accent1"/>
+          </a:effectRef>
+          <a:fontRef idx="minor">
+            <a:schemeClr val="tx1"/>
+          </a:fontRef>
+        </p:style>
+      </p:cxnSp>
+      <p:cxnSp>
+        <p:nvCxnSpPr>
+          <p:cNvPr id="5" name="Straight Arrow Connector 4">
+            <a:extLst>
+              <a:ext uri="{FF2B5EF4-FFF2-40B4-BE49-F238E27FC236}">
+                <a16:creationId xmlns:a16="http://schemas.microsoft.com/office/drawing/2014/main" id="{C82E0791-65B3-4DD4-9154-26C28F4CEDD9}"/>
+              </a:ext>
+            </a:extLst>
+          </p:cNvPr>
+          <p:cNvCxnSpPr>
+            <a:cxnSpLocks/>
+          </p:cNvCxnSpPr>
+          <p:nvPr/>
+        </p:nvCxnSpPr>
+        <p:spPr>
+          <a:xfrm flipV="1">
+            <a:off x="1795244" y="1300294"/>
+            <a:ext cx="8389" cy="3573713"/>
+          </a:xfrm>
+          <a:prstGeom prst="straightConnector1">
+            <a:avLst/>
+          </a:prstGeom>
+          <a:ln>
+            <a:tailEnd type="triangle"/>
+          </a:ln>
+        </p:spPr>
+        <p:style>
+          <a:lnRef idx="1">
+            <a:schemeClr val="accent1"/>
+          </a:lnRef>
+          <a:fillRef idx="0">
+            <a:schemeClr val="accent1"/>
+          </a:fillRef>
+          <a:effectRef idx="0">
+            <a:schemeClr val="accent1"/>
+          </a:effectRef>
+          <a:fontRef idx="minor">
+            <a:schemeClr val="tx1"/>
+          </a:fontRef>
+        </p:style>
+      </p:cxnSp>
+      <p:sp>
+        <p:nvSpPr>
+          <p:cNvPr id="12" name="Oval 11">
+            <a:extLst>
+              <a:ext uri="{FF2B5EF4-FFF2-40B4-BE49-F238E27FC236}">
+                <a16:creationId xmlns:a16="http://schemas.microsoft.com/office/drawing/2014/main" id="{6982BF39-853C-49D4-9E0E-E50DE8B7E015}"/>
+              </a:ext>
+            </a:extLst>
+          </p:cNvPr>
+          <p:cNvSpPr/>
+          <p:nvPr/>
+        </p:nvSpPr>
+        <p:spPr>
+          <a:xfrm>
+            <a:off x="4283863" y="3087150"/>
+            <a:ext cx="443883" cy="443883"/>
+          </a:xfrm>
+          <a:prstGeom prst="ellipse">
+            <a:avLst/>
+          </a:prstGeom>
+          <a:solidFill>
+            <a:schemeClr val="tx1"/>
+          </a:solidFill>
+        </p:spPr>
+        <p:style>
+          <a:lnRef idx="2">
+            <a:schemeClr val="accent1">
+              <a:shade val="50000"/>
+            </a:schemeClr>
+          </a:lnRef>
+          <a:fillRef idx="1">
+            <a:schemeClr val="accent1"/>
+          </a:fillRef>
+          <a:effectRef idx="0">
+            <a:schemeClr val="accent1"/>
+          </a:effectRef>
+          <a:fontRef idx="minor">
+            <a:schemeClr val="lt1"/>
+          </a:fontRef>
+        </p:style>
+        <p:txBody>
+          <a:bodyPr rtlCol="0" anchor="ctr"/>
+          <a:lstStyle/>
+          <a:p>
+            <a:pPr algn="ctr"/>
+            <a:r>
+              <a:rPr lang="en-GB" dirty="0"/>
+              <a:t>1</a:t>
+            </a:r>
+          </a:p>
+        </p:txBody>
+      </p:sp>
+      <p:sp>
+        <p:nvSpPr>
+          <p:cNvPr id="13" name="Oval 12">
+            <a:extLst>
+              <a:ext uri="{FF2B5EF4-FFF2-40B4-BE49-F238E27FC236}">
+                <a16:creationId xmlns:a16="http://schemas.microsoft.com/office/drawing/2014/main" id="{6A2C742F-4A6A-48B7-9B51-6D0814ACC823}"/>
+              </a:ext>
+            </a:extLst>
+          </p:cNvPr>
+          <p:cNvSpPr/>
+          <p:nvPr/>
+        </p:nvSpPr>
+        <p:spPr>
+          <a:xfrm>
+            <a:off x="2675733" y="2163916"/>
+            <a:ext cx="443883" cy="443883"/>
+          </a:xfrm>
+          <a:prstGeom prst="ellipse">
+            <a:avLst/>
+          </a:prstGeom>
+          <a:solidFill>
+            <a:schemeClr val="tx1"/>
+          </a:solidFill>
+        </p:spPr>
+        <p:style>
+          <a:lnRef idx="2">
+            <a:schemeClr val="accent1">
+              <a:shade val="50000"/>
+            </a:schemeClr>
+          </a:lnRef>
+          <a:fillRef idx="1">
+            <a:schemeClr val="accent1"/>
+          </a:fillRef>
+          <a:effectRef idx="0">
+            <a:schemeClr val="accent1"/>
+          </a:effectRef>
+          <a:fontRef idx="minor">
+            <a:schemeClr val="lt1"/>
+          </a:fontRef>
+        </p:style>
+        <p:txBody>
+          <a:bodyPr rtlCol="0" anchor="ctr"/>
+          <a:lstStyle/>
+          <a:p>
+            <a:pPr algn="ctr"/>
+            <a:r>
+              <a:rPr lang="en-GB" dirty="0"/>
+              <a:t>2</a:t>
+            </a:r>
+          </a:p>
+        </p:txBody>
+      </p:sp>
+      <p:cxnSp>
+        <p:nvCxnSpPr>
+          <p:cNvPr id="15" name="Straight Arrow Connector 14">
+            <a:extLst>
+              <a:ext uri="{FF2B5EF4-FFF2-40B4-BE49-F238E27FC236}">
+                <a16:creationId xmlns:a16="http://schemas.microsoft.com/office/drawing/2014/main" id="{7E51983A-6051-4806-B3CC-D79731DE285B}"/>
+              </a:ext>
+            </a:extLst>
+          </p:cNvPr>
+          <p:cNvCxnSpPr>
+            <a:stCxn id="13" idx="5"/>
+          </p:cNvCxnSpPr>
+          <p:nvPr/>
+        </p:nvCxnSpPr>
+        <p:spPr>
+          <a:xfrm>
+            <a:off x="3054611" y="2542794"/>
+            <a:ext cx="1229252" cy="636634"/>
+          </a:xfrm>
+          <a:prstGeom prst="straightConnector1">
+            <a:avLst/>
+          </a:prstGeom>
+          <a:ln>
+            <a:headEnd type="triangle"/>
+            <a:tailEnd type="triangle"/>
+          </a:ln>
+        </p:spPr>
+        <p:style>
+          <a:lnRef idx="1">
+            <a:schemeClr val="accent1"/>
+          </a:lnRef>
+          <a:fillRef idx="0">
+            <a:schemeClr val="accent1"/>
+          </a:fillRef>
+          <a:effectRef idx="0">
+            <a:schemeClr val="accent1"/>
+          </a:effectRef>
+          <a:fontRef idx="minor">
+            <a:schemeClr val="tx1"/>
+          </a:fontRef>
+        </p:style>
+      </p:cxnSp>
+      <p:sp>
+        <p:nvSpPr>
+          <p:cNvPr id="16" name="TextBox 15">
+            <a:extLst>
+              <a:ext uri="{FF2B5EF4-FFF2-40B4-BE49-F238E27FC236}">
+                <a16:creationId xmlns:a16="http://schemas.microsoft.com/office/drawing/2014/main" id="{EF936310-90A3-4C58-9F25-2C316E23353E}"/>
+              </a:ext>
+            </a:extLst>
+          </p:cNvPr>
+          <p:cNvSpPr txBox="1"/>
+          <p:nvPr/>
+        </p:nvSpPr>
+        <p:spPr>
+          <a:xfrm>
+            <a:off x="3531765" y="5075339"/>
+            <a:ext cx="1115736" cy="369332"/>
+          </a:xfrm>
+          <a:prstGeom prst="rect">
+            <a:avLst/>
+          </a:prstGeom>
+          <a:noFill/>
+        </p:spPr>
+        <p:txBody>
+          <a:bodyPr wrap="square" rtlCol="0">
+            <a:spAutoFit/>
+          </a:bodyPr>
+          <a:lstStyle/>
+          <a:p>
+            <a:r>
+              <a:rPr lang="en-GB" dirty="0"/>
+              <a:t>1 unit</a:t>
+            </a:r>
+          </a:p>
+        </p:txBody>
+      </p:sp>
+      <p:sp>
+        <p:nvSpPr>
+          <p:cNvPr id="17" name="TextBox 16">
+            <a:extLst>
+              <a:ext uri="{FF2B5EF4-FFF2-40B4-BE49-F238E27FC236}">
+                <a16:creationId xmlns:a16="http://schemas.microsoft.com/office/drawing/2014/main" id="{FC678B38-21E8-4388-B8AB-F937FD4F0BB0}"/>
+              </a:ext>
+            </a:extLst>
+          </p:cNvPr>
+          <p:cNvSpPr txBox="1"/>
+          <p:nvPr/>
+        </p:nvSpPr>
+        <p:spPr>
+          <a:xfrm rot="16200000">
+            <a:off x="865464" y="2895707"/>
+            <a:ext cx="1115736" cy="369332"/>
+          </a:xfrm>
+          <a:prstGeom prst="rect">
+            <a:avLst/>
+          </a:prstGeom>
+          <a:noFill/>
+        </p:spPr>
+        <p:txBody>
+          <a:bodyPr wrap="square" rtlCol="0">
+            <a:spAutoFit/>
+          </a:bodyPr>
+          <a:lstStyle/>
+          <a:p>
+            <a:r>
+              <a:rPr lang="en-GB" dirty="0"/>
+              <a:t>1 unit</a:t>
+            </a:r>
+          </a:p>
+        </p:txBody>
+      </p:sp>
+    </p:spTree>
+    <p:extLst>
+      <p:ext uri="{BB962C8B-B14F-4D97-AF65-F5344CB8AC3E}">
+        <p14:creationId xmlns:p14="http://schemas.microsoft.com/office/powerpoint/2010/main" val="3266342821"/>
       </p:ext>
     </p:extLst>
   </p:cSld>

</xml_diff>

<commit_message>
Simple model using Python
</commit_message>
<xml_diff>
--- a/nne_distribution/Presentation1.pptx
+++ b/nne_distribution/Presentation1.pptx
@@ -9,6 +9,9 @@
     <p:sldId id="257" r:id="rId3"/>
     <p:sldId id="258" r:id="rId4"/>
     <p:sldId id="259" r:id="rId5"/>
+    <p:sldId id="260" r:id="rId6"/>
+    <p:sldId id="261" r:id="rId7"/>
+    <p:sldId id="262" r:id="rId8"/>
   </p:sldIdLst>
   <p:sldSz cx="12192000" cy="6858000"/>
   <p:notesSz cx="6858000" cy="9144000"/>
@@ -4572,6 +4575,1949 @@
 </p:sld>
 </file>
 
+<file path=ppt/slides/slide5.xml><?xml version="1.0" encoding="utf-8"?>
+<p:sld xmlns:a="http://schemas.openxmlformats.org/drawingml/2006/main" xmlns:r="http://schemas.openxmlformats.org/officeDocument/2006/relationships" xmlns:p="http://schemas.openxmlformats.org/presentationml/2006/main">
+  <p:cSld>
+    <p:spTree>
+      <p:nvGrpSpPr>
+        <p:cNvPr id="1" name=""/>
+        <p:cNvGrpSpPr/>
+        <p:nvPr/>
+      </p:nvGrpSpPr>
+      <p:grpSpPr>
+        <a:xfrm>
+          <a:off x="0" y="0"/>
+          <a:ext cx="0" cy="0"/>
+          <a:chOff x="0" y="0"/>
+          <a:chExt cx="0" cy="0"/>
+        </a:xfrm>
+      </p:grpSpPr>
+      <p:sp>
+        <p:nvSpPr>
+          <p:cNvPr id="2" name="Rectangle 1">
+            <a:extLst>
+              <a:ext uri="{FF2B5EF4-FFF2-40B4-BE49-F238E27FC236}">
+                <a16:creationId xmlns:a16="http://schemas.microsoft.com/office/drawing/2014/main" id="{42C3490C-B636-4A26-86CA-10E1F7E2FE6E}"/>
+              </a:ext>
+            </a:extLst>
+          </p:cNvPr>
+          <p:cNvSpPr/>
+          <p:nvPr/>
+        </p:nvSpPr>
+        <p:spPr>
+          <a:xfrm>
+            <a:off x="3229762" y="528506"/>
+            <a:ext cx="5025005" cy="5050173"/>
+          </a:xfrm>
+          <a:prstGeom prst="rect">
+            <a:avLst/>
+          </a:prstGeom>
+          <a:noFill/>
+        </p:spPr>
+        <p:style>
+          <a:lnRef idx="2">
+            <a:schemeClr val="accent1">
+              <a:shade val="50000"/>
+            </a:schemeClr>
+          </a:lnRef>
+          <a:fillRef idx="1">
+            <a:schemeClr val="accent1"/>
+          </a:fillRef>
+          <a:effectRef idx="0">
+            <a:schemeClr val="accent1"/>
+          </a:effectRef>
+          <a:fontRef idx="minor">
+            <a:schemeClr val="lt1"/>
+          </a:fontRef>
+        </p:style>
+        <p:txBody>
+          <a:bodyPr rtlCol="0" anchor="ctr"/>
+          <a:lstStyle/>
+          <a:p>
+            <a:pPr algn="ctr"/>
+            <a:endParaRPr lang="en-GB"/>
+          </a:p>
+        </p:txBody>
+      </p:sp>
+      <p:sp>
+        <p:nvSpPr>
+          <p:cNvPr id="3" name="Oval 2">
+            <a:extLst>
+              <a:ext uri="{FF2B5EF4-FFF2-40B4-BE49-F238E27FC236}">
+                <a16:creationId xmlns:a16="http://schemas.microsoft.com/office/drawing/2014/main" id="{CB8B9BE7-09E1-41EA-9EF3-3E7AD0902CAC}"/>
+              </a:ext>
+            </a:extLst>
+          </p:cNvPr>
+          <p:cNvSpPr/>
+          <p:nvPr/>
+        </p:nvSpPr>
+        <p:spPr>
+          <a:xfrm>
+            <a:off x="4576171" y="3486990"/>
+            <a:ext cx="443883" cy="443883"/>
+          </a:xfrm>
+          <a:prstGeom prst="ellipse">
+            <a:avLst/>
+          </a:prstGeom>
+          <a:solidFill>
+            <a:schemeClr val="tx1"/>
+          </a:solidFill>
+        </p:spPr>
+        <p:style>
+          <a:lnRef idx="2">
+            <a:schemeClr val="accent1">
+              <a:shade val="50000"/>
+            </a:schemeClr>
+          </a:lnRef>
+          <a:fillRef idx="1">
+            <a:schemeClr val="accent1"/>
+          </a:fillRef>
+          <a:effectRef idx="0">
+            <a:schemeClr val="accent1"/>
+          </a:effectRef>
+          <a:fontRef idx="minor">
+            <a:schemeClr val="lt1"/>
+          </a:fontRef>
+        </p:style>
+        <p:txBody>
+          <a:bodyPr rtlCol="0" anchor="ctr"/>
+          <a:lstStyle/>
+          <a:p>
+            <a:pPr algn="ctr"/>
+            <a:r>
+              <a:rPr lang="en-GB" dirty="0"/>
+              <a:t>1</a:t>
+            </a:r>
+          </a:p>
+        </p:txBody>
+      </p:sp>
+      <p:sp>
+        <p:nvSpPr>
+          <p:cNvPr id="4" name="Oval 3">
+            <a:extLst>
+              <a:ext uri="{FF2B5EF4-FFF2-40B4-BE49-F238E27FC236}">
+                <a16:creationId xmlns:a16="http://schemas.microsoft.com/office/drawing/2014/main" id="{B512F3AC-0DEB-4D93-AF76-2E3F7EBA7219}"/>
+              </a:ext>
+            </a:extLst>
+          </p:cNvPr>
+          <p:cNvSpPr/>
+          <p:nvPr/>
+        </p:nvSpPr>
+        <p:spPr>
+          <a:xfrm>
+            <a:off x="6550289" y="3486990"/>
+            <a:ext cx="443883" cy="443883"/>
+          </a:xfrm>
+          <a:prstGeom prst="ellipse">
+            <a:avLst/>
+          </a:prstGeom>
+          <a:solidFill>
+            <a:schemeClr val="tx1"/>
+          </a:solidFill>
+        </p:spPr>
+        <p:style>
+          <a:lnRef idx="2">
+            <a:schemeClr val="accent1">
+              <a:shade val="50000"/>
+            </a:schemeClr>
+          </a:lnRef>
+          <a:fillRef idx="1">
+            <a:schemeClr val="accent1"/>
+          </a:fillRef>
+          <a:effectRef idx="0">
+            <a:schemeClr val="accent1"/>
+          </a:effectRef>
+          <a:fontRef idx="minor">
+            <a:schemeClr val="lt1"/>
+          </a:fontRef>
+        </p:style>
+        <p:txBody>
+          <a:bodyPr rtlCol="0" anchor="ctr"/>
+          <a:lstStyle/>
+          <a:p>
+            <a:pPr algn="ctr"/>
+            <a:r>
+              <a:rPr lang="en-GB" dirty="0"/>
+              <a:t>2</a:t>
+            </a:r>
+          </a:p>
+        </p:txBody>
+      </p:sp>
+      <p:sp>
+        <p:nvSpPr>
+          <p:cNvPr id="5" name="Oval 4">
+            <a:extLst>
+              <a:ext uri="{FF2B5EF4-FFF2-40B4-BE49-F238E27FC236}">
+                <a16:creationId xmlns:a16="http://schemas.microsoft.com/office/drawing/2014/main" id="{41972744-542A-47C0-B1BA-61DDDD7AB06E}"/>
+              </a:ext>
+            </a:extLst>
+          </p:cNvPr>
+          <p:cNvSpPr/>
+          <p:nvPr/>
+        </p:nvSpPr>
+        <p:spPr>
+          <a:xfrm>
+            <a:off x="4576171" y="1785807"/>
+            <a:ext cx="443883" cy="443883"/>
+          </a:xfrm>
+          <a:prstGeom prst="ellipse">
+            <a:avLst/>
+          </a:prstGeom>
+          <a:solidFill>
+            <a:schemeClr val="tx1"/>
+          </a:solidFill>
+        </p:spPr>
+        <p:style>
+          <a:lnRef idx="2">
+            <a:schemeClr val="accent1">
+              <a:shade val="50000"/>
+            </a:schemeClr>
+          </a:lnRef>
+          <a:fillRef idx="1">
+            <a:schemeClr val="accent1"/>
+          </a:fillRef>
+          <a:effectRef idx="0">
+            <a:schemeClr val="accent1"/>
+          </a:effectRef>
+          <a:fontRef idx="minor">
+            <a:schemeClr val="lt1"/>
+          </a:fontRef>
+        </p:style>
+        <p:txBody>
+          <a:bodyPr rtlCol="0" anchor="ctr"/>
+          <a:lstStyle/>
+          <a:p>
+            <a:pPr algn="ctr"/>
+            <a:r>
+              <a:rPr lang="en-GB" dirty="0"/>
+              <a:t>4</a:t>
+            </a:r>
+          </a:p>
+        </p:txBody>
+      </p:sp>
+      <p:sp>
+        <p:nvSpPr>
+          <p:cNvPr id="6" name="Oval 5">
+            <a:extLst>
+              <a:ext uri="{FF2B5EF4-FFF2-40B4-BE49-F238E27FC236}">
+                <a16:creationId xmlns:a16="http://schemas.microsoft.com/office/drawing/2014/main" id="{F3F3432B-E33D-4699-9625-9A9B35F08A14}"/>
+              </a:ext>
+            </a:extLst>
+          </p:cNvPr>
+          <p:cNvSpPr/>
+          <p:nvPr/>
+        </p:nvSpPr>
+        <p:spPr>
+          <a:xfrm>
+            <a:off x="6550289" y="1785807"/>
+            <a:ext cx="443883" cy="443883"/>
+          </a:xfrm>
+          <a:prstGeom prst="ellipse">
+            <a:avLst/>
+          </a:prstGeom>
+          <a:solidFill>
+            <a:schemeClr val="tx1"/>
+          </a:solidFill>
+        </p:spPr>
+        <p:style>
+          <a:lnRef idx="2">
+            <a:schemeClr val="accent1">
+              <a:shade val="50000"/>
+            </a:schemeClr>
+          </a:lnRef>
+          <a:fillRef idx="1">
+            <a:schemeClr val="accent1"/>
+          </a:fillRef>
+          <a:effectRef idx="0">
+            <a:schemeClr val="accent1"/>
+          </a:effectRef>
+          <a:fontRef idx="minor">
+            <a:schemeClr val="lt1"/>
+          </a:fontRef>
+        </p:style>
+        <p:txBody>
+          <a:bodyPr rtlCol="0" anchor="ctr"/>
+          <a:lstStyle/>
+          <a:p>
+            <a:pPr algn="ctr"/>
+            <a:r>
+              <a:rPr lang="en-GB" dirty="0"/>
+              <a:t>3</a:t>
+            </a:r>
+          </a:p>
+        </p:txBody>
+      </p:sp>
+      <p:cxnSp>
+        <p:nvCxnSpPr>
+          <p:cNvPr id="8" name="Straight Connector 7">
+            <a:extLst>
+              <a:ext uri="{FF2B5EF4-FFF2-40B4-BE49-F238E27FC236}">
+                <a16:creationId xmlns:a16="http://schemas.microsoft.com/office/drawing/2014/main" id="{7B7A310C-91E4-4892-84ED-2650660044C3}"/>
+              </a:ext>
+            </a:extLst>
+          </p:cNvPr>
+          <p:cNvCxnSpPr/>
+          <p:nvPr/>
+        </p:nvCxnSpPr>
+        <p:spPr>
+          <a:xfrm>
+            <a:off x="2650921" y="3708931"/>
+            <a:ext cx="5931017" cy="0"/>
+          </a:xfrm>
+          <a:prstGeom prst="line">
+            <a:avLst/>
+          </a:prstGeom>
+          <a:ln>
+            <a:prstDash val="dashDot"/>
+          </a:ln>
+        </p:spPr>
+        <p:style>
+          <a:lnRef idx="1">
+            <a:schemeClr val="accent1"/>
+          </a:lnRef>
+          <a:fillRef idx="0">
+            <a:schemeClr val="accent1"/>
+          </a:fillRef>
+          <a:effectRef idx="0">
+            <a:schemeClr val="accent1"/>
+          </a:effectRef>
+          <a:fontRef idx="minor">
+            <a:schemeClr val="tx1"/>
+          </a:fontRef>
+        </p:style>
+      </p:cxnSp>
+      <p:cxnSp>
+        <p:nvCxnSpPr>
+          <p:cNvPr id="9" name="Straight Connector 8">
+            <a:extLst>
+              <a:ext uri="{FF2B5EF4-FFF2-40B4-BE49-F238E27FC236}">
+                <a16:creationId xmlns:a16="http://schemas.microsoft.com/office/drawing/2014/main" id="{6552516A-1301-4164-975D-5F266FE3A076}"/>
+              </a:ext>
+            </a:extLst>
+          </p:cNvPr>
+          <p:cNvCxnSpPr>
+            <a:cxnSpLocks/>
+          </p:cNvCxnSpPr>
+          <p:nvPr/>
+        </p:nvCxnSpPr>
+        <p:spPr>
+          <a:xfrm>
+            <a:off x="6772230" y="89281"/>
+            <a:ext cx="0" cy="5928621"/>
+          </a:xfrm>
+          <a:prstGeom prst="line">
+            <a:avLst/>
+          </a:prstGeom>
+          <a:ln>
+            <a:prstDash val="dashDot"/>
+          </a:ln>
+        </p:spPr>
+        <p:style>
+          <a:lnRef idx="1">
+            <a:schemeClr val="accent1"/>
+          </a:lnRef>
+          <a:fillRef idx="0">
+            <a:schemeClr val="accent1"/>
+          </a:fillRef>
+          <a:effectRef idx="0">
+            <a:schemeClr val="accent1"/>
+          </a:effectRef>
+          <a:fontRef idx="minor">
+            <a:schemeClr val="tx1"/>
+          </a:fontRef>
+        </p:style>
+      </p:cxnSp>
+      <p:cxnSp>
+        <p:nvCxnSpPr>
+          <p:cNvPr id="11" name="Straight Connector 10">
+            <a:extLst>
+              <a:ext uri="{FF2B5EF4-FFF2-40B4-BE49-F238E27FC236}">
+                <a16:creationId xmlns:a16="http://schemas.microsoft.com/office/drawing/2014/main" id="{C34F960F-1C6F-497A-B2AC-86810D70EE15}"/>
+              </a:ext>
+            </a:extLst>
+          </p:cNvPr>
+          <p:cNvCxnSpPr>
+            <a:cxnSpLocks/>
+          </p:cNvCxnSpPr>
+          <p:nvPr/>
+        </p:nvCxnSpPr>
+        <p:spPr>
+          <a:xfrm>
+            <a:off x="4776658" y="89281"/>
+            <a:ext cx="0" cy="5928621"/>
+          </a:xfrm>
+          <a:prstGeom prst="line">
+            <a:avLst/>
+          </a:prstGeom>
+          <a:ln>
+            <a:prstDash val="dashDot"/>
+          </a:ln>
+        </p:spPr>
+        <p:style>
+          <a:lnRef idx="1">
+            <a:schemeClr val="accent1"/>
+          </a:lnRef>
+          <a:fillRef idx="0">
+            <a:schemeClr val="accent1"/>
+          </a:fillRef>
+          <a:effectRef idx="0">
+            <a:schemeClr val="accent1"/>
+          </a:effectRef>
+          <a:fontRef idx="minor">
+            <a:schemeClr val="tx1"/>
+          </a:fontRef>
+        </p:style>
+      </p:cxnSp>
+      <p:cxnSp>
+        <p:nvCxnSpPr>
+          <p:cNvPr id="12" name="Straight Connector 11">
+            <a:extLst>
+              <a:ext uri="{FF2B5EF4-FFF2-40B4-BE49-F238E27FC236}">
+                <a16:creationId xmlns:a16="http://schemas.microsoft.com/office/drawing/2014/main" id="{966E707E-9B4E-49E8-A867-1B7176BCFD16}"/>
+              </a:ext>
+            </a:extLst>
+          </p:cNvPr>
+          <p:cNvCxnSpPr/>
+          <p:nvPr/>
+        </p:nvCxnSpPr>
+        <p:spPr>
+          <a:xfrm>
+            <a:off x="2776755" y="1993365"/>
+            <a:ext cx="5931017" cy="0"/>
+          </a:xfrm>
+          <a:prstGeom prst="line">
+            <a:avLst/>
+          </a:prstGeom>
+          <a:ln>
+            <a:prstDash val="dashDot"/>
+          </a:ln>
+        </p:spPr>
+        <p:style>
+          <a:lnRef idx="1">
+            <a:schemeClr val="accent1"/>
+          </a:lnRef>
+          <a:fillRef idx="0">
+            <a:schemeClr val="accent1"/>
+          </a:fillRef>
+          <a:effectRef idx="0">
+            <a:schemeClr val="accent1"/>
+          </a:effectRef>
+          <a:fontRef idx="minor">
+            <a:schemeClr val="tx1"/>
+          </a:fontRef>
+        </p:style>
+      </p:cxnSp>
+      <p:sp>
+        <p:nvSpPr>
+          <p:cNvPr id="13" name="TextBox 12">
+            <a:extLst>
+              <a:ext uri="{FF2B5EF4-FFF2-40B4-BE49-F238E27FC236}">
+                <a16:creationId xmlns:a16="http://schemas.microsoft.com/office/drawing/2014/main" id="{DC49E8B6-43EA-4AEC-86A4-30A97ACC4542}"/>
+              </a:ext>
+            </a:extLst>
+          </p:cNvPr>
+          <p:cNvSpPr txBox="1"/>
+          <p:nvPr/>
+        </p:nvSpPr>
+        <p:spPr>
+          <a:xfrm>
+            <a:off x="3640822" y="5813571"/>
+            <a:ext cx="562041" cy="369332"/>
+          </a:xfrm>
+          <a:prstGeom prst="rect">
+            <a:avLst/>
+          </a:prstGeom>
+          <a:noFill/>
+        </p:spPr>
+        <p:txBody>
+          <a:bodyPr wrap="square" rtlCol="0">
+            <a:spAutoFit/>
+          </a:bodyPr>
+          <a:lstStyle/>
+          <a:p>
+            <a:r>
+              <a:rPr lang="en-GB" dirty="0"/>
+              <a:t>1/3</a:t>
+            </a:r>
+          </a:p>
+        </p:txBody>
+      </p:sp>
+      <p:sp>
+        <p:nvSpPr>
+          <p:cNvPr id="14" name="TextBox 13">
+            <a:extLst>
+              <a:ext uri="{FF2B5EF4-FFF2-40B4-BE49-F238E27FC236}">
+                <a16:creationId xmlns:a16="http://schemas.microsoft.com/office/drawing/2014/main" id="{89265755-E219-470E-8A12-0ADB9075CD7C}"/>
+              </a:ext>
+            </a:extLst>
+          </p:cNvPr>
+          <p:cNvSpPr txBox="1"/>
+          <p:nvPr/>
+        </p:nvSpPr>
+        <p:spPr>
+          <a:xfrm>
+            <a:off x="5461242" y="5807870"/>
+            <a:ext cx="562041" cy="369332"/>
+          </a:xfrm>
+          <a:prstGeom prst="rect">
+            <a:avLst/>
+          </a:prstGeom>
+          <a:noFill/>
+        </p:spPr>
+        <p:txBody>
+          <a:bodyPr wrap="square" rtlCol="0">
+            <a:spAutoFit/>
+          </a:bodyPr>
+          <a:lstStyle/>
+          <a:p>
+            <a:r>
+              <a:rPr lang="en-GB" dirty="0"/>
+              <a:t>1/3</a:t>
+            </a:r>
+          </a:p>
+        </p:txBody>
+      </p:sp>
+      <p:sp>
+        <p:nvSpPr>
+          <p:cNvPr id="15" name="TextBox 14">
+            <a:extLst>
+              <a:ext uri="{FF2B5EF4-FFF2-40B4-BE49-F238E27FC236}">
+                <a16:creationId xmlns:a16="http://schemas.microsoft.com/office/drawing/2014/main" id="{6A7F9467-0D45-46AF-8857-B41E3187942A}"/>
+              </a:ext>
+            </a:extLst>
+          </p:cNvPr>
+          <p:cNvSpPr txBox="1"/>
+          <p:nvPr/>
+        </p:nvSpPr>
+        <p:spPr>
+          <a:xfrm>
+            <a:off x="7341766" y="5819255"/>
+            <a:ext cx="562041" cy="369332"/>
+          </a:xfrm>
+          <a:prstGeom prst="rect">
+            <a:avLst/>
+          </a:prstGeom>
+          <a:noFill/>
+        </p:spPr>
+        <p:txBody>
+          <a:bodyPr wrap="square" rtlCol="0">
+            <a:spAutoFit/>
+          </a:bodyPr>
+          <a:lstStyle/>
+          <a:p>
+            <a:r>
+              <a:rPr lang="en-GB" dirty="0"/>
+              <a:t>1/3</a:t>
+            </a:r>
+          </a:p>
+        </p:txBody>
+      </p:sp>
+      <p:sp>
+        <p:nvSpPr>
+          <p:cNvPr id="16" name="TextBox 15">
+            <a:extLst>
+              <a:ext uri="{FF2B5EF4-FFF2-40B4-BE49-F238E27FC236}">
+                <a16:creationId xmlns:a16="http://schemas.microsoft.com/office/drawing/2014/main" id="{36C63F56-B1C7-4BC4-B37F-38DF5468E097}"/>
+              </a:ext>
+            </a:extLst>
+          </p:cNvPr>
+          <p:cNvSpPr txBox="1"/>
+          <p:nvPr/>
+        </p:nvSpPr>
+        <p:spPr>
+          <a:xfrm>
+            <a:off x="2556750" y="2599979"/>
+            <a:ext cx="562041" cy="369332"/>
+          </a:xfrm>
+          <a:prstGeom prst="rect">
+            <a:avLst/>
+          </a:prstGeom>
+          <a:noFill/>
+        </p:spPr>
+        <p:txBody>
+          <a:bodyPr wrap="square" rtlCol="0">
+            <a:spAutoFit/>
+          </a:bodyPr>
+          <a:lstStyle/>
+          <a:p>
+            <a:r>
+              <a:rPr lang="en-GB" dirty="0"/>
+              <a:t>1/3</a:t>
+            </a:r>
+          </a:p>
+        </p:txBody>
+      </p:sp>
+      <p:sp>
+        <p:nvSpPr>
+          <p:cNvPr id="17" name="TextBox 16">
+            <a:extLst>
+              <a:ext uri="{FF2B5EF4-FFF2-40B4-BE49-F238E27FC236}">
+                <a16:creationId xmlns:a16="http://schemas.microsoft.com/office/drawing/2014/main" id="{78C050D0-6399-4613-8C3E-6A2A139DA432}"/>
+              </a:ext>
+            </a:extLst>
+          </p:cNvPr>
+          <p:cNvSpPr txBox="1"/>
+          <p:nvPr/>
+        </p:nvSpPr>
+        <p:spPr>
+          <a:xfrm>
+            <a:off x="2495734" y="4448552"/>
+            <a:ext cx="562041" cy="369332"/>
+          </a:xfrm>
+          <a:prstGeom prst="rect">
+            <a:avLst/>
+          </a:prstGeom>
+          <a:noFill/>
+        </p:spPr>
+        <p:txBody>
+          <a:bodyPr wrap="square" rtlCol="0">
+            <a:spAutoFit/>
+          </a:bodyPr>
+          <a:lstStyle/>
+          <a:p>
+            <a:r>
+              <a:rPr lang="en-GB" dirty="0"/>
+              <a:t>1/3</a:t>
+            </a:r>
+          </a:p>
+        </p:txBody>
+      </p:sp>
+      <p:sp>
+        <p:nvSpPr>
+          <p:cNvPr id="18" name="TextBox 17">
+            <a:extLst>
+              <a:ext uri="{FF2B5EF4-FFF2-40B4-BE49-F238E27FC236}">
+                <a16:creationId xmlns:a16="http://schemas.microsoft.com/office/drawing/2014/main" id="{483865DF-C466-4D57-AE49-C68A2BE03BA2}"/>
+              </a:ext>
+            </a:extLst>
+          </p:cNvPr>
+          <p:cNvSpPr txBox="1"/>
+          <p:nvPr/>
+        </p:nvSpPr>
+        <p:spPr>
+          <a:xfrm>
+            <a:off x="2495733" y="936072"/>
+            <a:ext cx="562041" cy="369332"/>
+          </a:xfrm>
+          <a:prstGeom prst="rect">
+            <a:avLst/>
+          </a:prstGeom>
+          <a:noFill/>
+        </p:spPr>
+        <p:txBody>
+          <a:bodyPr wrap="square" rtlCol="0">
+            <a:spAutoFit/>
+          </a:bodyPr>
+          <a:lstStyle/>
+          <a:p>
+            <a:r>
+              <a:rPr lang="en-GB" dirty="0"/>
+              <a:t>1/3</a:t>
+            </a:r>
+          </a:p>
+        </p:txBody>
+      </p:sp>
+    </p:spTree>
+    <p:extLst>
+      <p:ext uri="{BB962C8B-B14F-4D97-AF65-F5344CB8AC3E}">
+        <p14:creationId xmlns:p14="http://schemas.microsoft.com/office/powerpoint/2010/main" val="1911905091"/>
+      </p:ext>
+    </p:extLst>
+  </p:cSld>
+  <p:clrMapOvr>
+    <a:masterClrMapping/>
+  </p:clrMapOvr>
+</p:sld>
+</file>
+
+<file path=ppt/slides/slide6.xml><?xml version="1.0" encoding="utf-8"?>
+<p:sld xmlns:a="http://schemas.openxmlformats.org/drawingml/2006/main" xmlns:r="http://schemas.openxmlformats.org/officeDocument/2006/relationships" xmlns:p="http://schemas.openxmlformats.org/presentationml/2006/main">
+  <p:cSld>
+    <p:spTree>
+      <p:nvGrpSpPr>
+        <p:cNvPr id="1" name=""/>
+        <p:cNvGrpSpPr/>
+        <p:nvPr/>
+      </p:nvGrpSpPr>
+      <p:grpSpPr>
+        <a:xfrm>
+          <a:off x="0" y="0"/>
+          <a:ext cx="0" cy="0"/>
+          <a:chOff x="0" y="0"/>
+          <a:chExt cx="0" cy="0"/>
+        </a:xfrm>
+      </p:grpSpPr>
+      <p:sp>
+        <p:nvSpPr>
+          <p:cNvPr id="2" name="Rectangle 1">
+            <a:extLst>
+              <a:ext uri="{FF2B5EF4-FFF2-40B4-BE49-F238E27FC236}">
+                <a16:creationId xmlns:a16="http://schemas.microsoft.com/office/drawing/2014/main" id="{42C3490C-B636-4A26-86CA-10E1F7E2FE6E}"/>
+              </a:ext>
+            </a:extLst>
+          </p:cNvPr>
+          <p:cNvSpPr/>
+          <p:nvPr/>
+        </p:nvSpPr>
+        <p:spPr>
+          <a:xfrm>
+            <a:off x="3229762" y="528506"/>
+            <a:ext cx="5025005" cy="5050173"/>
+          </a:xfrm>
+          <a:prstGeom prst="rect">
+            <a:avLst/>
+          </a:prstGeom>
+          <a:noFill/>
+        </p:spPr>
+        <p:style>
+          <a:lnRef idx="2">
+            <a:schemeClr val="accent1">
+              <a:shade val="50000"/>
+            </a:schemeClr>
+          </a:lnRef>
+          <a:fillRef idx="1">
+            <a:schemeClr val="accent1"/>
+          </a:fillRef>
+          <a:effectRef idx="0">
+            <a:schemeClr val="accent1"/>
+          </a:effectRef>
+          <a:fontRef idx="minor">
+            <a:schemeClr val="lt1"/>
+          </a:fontRef>
+        </p:style>
+        <p:txBody>
+          <a:bodyPr rtlCol="0" anchor="ctr"/>
+          <a:lstStyle/>
+          <a:p>
+            <a:pPr algn="ctr"/>
+            <a:endParaRPr lang="en-GB"/>
+          </a:p>
+        </p:txBody>
+      </p:sp>
+      <p:sp>
+        <p:nvSpPr>
+          <p:cNvPr id="3" name="Oval 2">
+            <a:extLst>
+              <a:ext uri="{FF2B5EF4-FFF2-40B4-BE49-F238E27FC236}">
+                <a16:creationId xmlns:a16="http://schemas.microsoft.com/office/drawing/2014/main" id="{CB8B9BE7-09E1-41EA-9EF3-3E7AD0902CAC}"/>
+              </a:ext>
+            </a:extLst>
+          </p:cNvPr>
+          <p:cNvSpPr/>
+          <p:nvPr/>
+        </p:nvSpPr>
+        <p:spPr>
+          <a:xfrm>
+            <a:off x="4154658" y="4184428"/>
+            <a:ext cx="443883" cy="443883"/>
+          </a:xfrm>
+          <a:prstGeom prst="ellipse">
+            <a:avLst/>
+          </a:prstGeom>
+          <a:solidFill>
+            <a:schemeClr val="tx1"/>
+          </a:solidFill>
+        </p:spPr>
+        <p:style>
+          <a:lnRef idx="2">
+            <a:schemeClr val="accent1">
+              <a:shade val="50000"/>
+            </a:schemeClr>
+          </a:lnRef>
+          <a:fillRef idx="1">
+            <a:schemeClr val="accent1"/>
+          </a:fillRef>
+          <a:effectRef idx="0">
+            <a:schemeClr val="accent1"/>
+          </a:effectRef>
+          <a:fontRef idx="minor">
+            <a:schemeClr val="lt1"/>
+          </a:fontRef>
+        </p:style>
+        <p:txBody>
+          <a:bodyPr rtlCol="0" anchor="ctr"/>
+          <a:lstStyle/>
+          <a:p>
+            <a:pPr algn="ctr"/>
+            <a:r>
+              <a:rPr lang="en-GB" dirty="0"/>
+              <a:t>1</a:t>
+            </a:r>
+          </a:p>
+        </p:txBody>
+      </p:sp>
+      <p:sp>
+        <p:nvSpPr>
+          <p:cNvPr id="4" name="Oval 3">
+            <a:extLst>
+              <a:ext uri="{FF2B5EF4-FFF2-40B4-BE49-F238E27FC236}">
+                <a16:creationId xmlns:a16="http://schemas.microsoft.com/office/drawing/2014/main" id="{B512F3AC-0DEB-4D93-AF76-2E3F7EBA7219}"/>
+              </a:ext>
+            </a:extLst>
+          </p:cNvPr>
+          <p:cNvSpPr/>
+          <p:nvPr/>
+        </p:nvSpPr>
+        <p:spPr>
+          <a:xfrm>
+            <a:off x="5461242" y="4184427"/>
+            <a:ext cx="443883" cy="443883"/>
+          </a:xfrm>
+          <a:prstGeom prst="ellipse">
+            <a:avLst/>
+          </a:prstGeom>
+          <a:solidFill>
+            <a:schemeClr val="tx1"/>
+          </a:solidFill>
+        </p:spPr>
+        <p:style>
+          <a:lnRef idx="2">
+            <a:schemeClr val="accent1">
+              <a:shade val="50000"/>
+            </a:schemeClr>
+          </a:lnRef>
+          <a:fillRef idx="1">
+            <a:schemeClr val="accent1"/>
+          </a:fillRef>
+          <a:effectRef idx="0">
+            <a:schemeClr val="accent1"/>
+          </a:effectRef>
+          <a:fontRef idx="minor">
+            <a:schemeClr val="lt1"/>
+          </a:fontRef>
+        </p:style>
+        <p:txBody>
+          <a:bodyPr rtlCol="0" anchor="ctr"/>
+          <a:lstStyle/>
+          <a:p>
+            <a:pPr algn="ctr"/>
+            <a:r>
+              <a:rPr lang="en-GB" dirty="0"/>
+              <a:t>2</a:t>
+            </a:r>
+          </a:p>
+        </p:txBody>
+      </p:sp>
+      <p:sp>
+        <p:nvSpPr>
+          <p:cNvPr id="5" name="Oval 4">
+            <a:extLst>
+              <a:ext uri="{FF2B5EF4-FFF2-40B4-BE49-F238E27FC236}">
+                <a16:creationId xmlns:a16="http://schemas.microsoft.com/office/drawing/2014/main" id="{41972744-542A-47C0-B1BA-61DDDD7AB06E}"/>
+              </a:ext>
+            </a:extLst>
+          </p:cNvPr>
+          <p:cNvSpPr/>
+          <p:nvPr/>
+        </p:nvSpPr>
+        <p:spPr>
+          <a:xfrm>
+            <a:off x="6858004" y="2996831"/>
+            <a:ext cx="443883" cy="443883"/>
+          </a:xfrm>
+          <a:prstGeom prst="ellipse">
+            <a:avLst/>
+          </a:prstGeom>
+          <a:solidFill>
+            <a:schemeClr val="tx1"/>
+          </a:solidFill>
+        </p:spPr>
+        <p:style>
+          <a:lnRef idx="2">
+            <a:schemeClr val="accent1">
+              <a:shade val="50000"/>
+            </a:schemeClr>
+          </a:lnRef>
+          <a:fillRef idx="1">
+            <a:schemeClr val="accent1"/>
+          </a:fillRef>
+          <a:effectRef idx="0">
+            <a:schemeClr val="accent1"/>
+          </a:effectRef>
+          <a:fontRef idx="minor">
+            <a:schemeClr val="lt1"/>
+          </a:fontRef>
+        </p:style>
+        <p:txBody>
+          <a:bodyPr rtlCol="0" anchor="ctr"/>
+          <a:lstStyle/>
+          <a:p>
+            <a:pPr algn="ctr"/>
+            <a:r>
+              <a:rPr lang="en-GB" dirty="0"/>
+              <a:t>6</a:t>
+            </a:r>
+          </a:p>
+        </p:txBody>
+      </p:sp>
+      <p:sp>
+        <p:nvSpPr>
+          <p:cNvPr id="6" name="Oval 5">
+            <a:extLst>
+              <a:ext uri="{FF2B5EF4-FFF2-40B4-BE49-F238E27FC236}">
+                <a16:creationId xmlns:a16="http://schemas.microsoft.com/office/drawing/2014/main" id="{F3F3432B-E33D-4699-9625-9A9B35F08A14}"/>
+              </a:ext>
+            </a:extLst>
+          </p:cNvPr>
+          <p:cNvSpPr/>
+          <p:nvPr/>
+        </p:nvSpPr>
+        <p:spPr>
+          <a:xfrm>
+            <a:off x="6858004" y="4184426"/>
+            <a:ext cx="443883" cy="443883"/>
+          </a:xfrm>
+          <a:prstGeom prst="ellipse">
+            <a:avLst/>
+          </a:prstGeom>
+          <a:solidFill>
+            <a:schemeClr val="tx1"/>
+          </a:solidFill>
+        </p:spPr>
+        <p:style>
+          <a:lnRef idx="2">
+            <a:schemeClr val="accent1">
+              <a:shade val="50000"/>
+            </a:schemeClr>
+          </a:lnRef>
+          <a:fillRef idx="1">
+            <a:schemeClr val="accent1"/>
+          </a:fillRef>
+          <a:effectRef idx="0">
+            <a:schemeClr val="accent1"/>
+          </a:effectRef>
+          <a:fontRef idx="minor">
+            <a:schemeClr val="lt1"/>
+          </a:fontRef>
+        </p:style>
+        <p:txBody>
+          <a:bodyPr rtlCol="0" anchor="ctr"/>
+          <a:lstStyle/>
+          <a:p>
+            <a:pPr algn="ctr"/>
+            <a:r>
+              <a:rPr lang="en-GB" dirty="0"/>
+              <a:t>3</a:t>
+            </a:r>
+          </a:p>
+        </p:txBody>
+      </p:sp>
+      <p:cxnSp>
+        <p:nvCxnSpPr>
+          <p:cNvPr id="8" name="Straight Connector 7">
+            <a:extLst>
+              <a:ext uri="{FF2B5EF4-FFF2-40B4-BE49-F238E27FC236}">
+                <a16:creationId xmlns:a16="http://schemas.microsoft.com/office/drawing/2014/main" id="{7B7A310C-91E4-4892-84ED-2650660044C3}"/>
+              </a:ext>
+            </a:extLst>
+          </p:cNvPr>
+          <p:cNvCxnSpPr/>
+          <p:nvPr/>
+        </p:nvCxnSpPr>
+        <p:spPr>
+          <a:xfrm>
+            <a:off x="2717674" y="4432531"/>
+            <a:ext cx="5931017" cy="0"/>
+          </a:xfrm>
+          <a:prstGeom prst="line">
+            <a:avLst/>
+          </a:prstGeom>
+          <a:ln>
+            <a:prstDash val="dashDot"/>
+          </a:ln>
+        </p:spPr>
+        <p:style>
+          <a:lnRef idx="1">
+            <a:schemeClr val="accent1"/>
+          </a:lnRef>
+          <a:fillRef idx="0">
+            <a:schemeClr val="accent1"/>
+          </a:fillRef>
+          <a:effectRef idx="0">
+            <a:schemeClr val="accent1"/>
+          </a:effectRef>
+          <a:fontRef idx="minor">
+            <a:schemeClr val="tx1"/>
+          </a:fontRef>
+        </p:style>
+      </p:cxnSp>
+      <p:cxnSp>
+        <p:nvCxnSpPr>
+          <p:cNvPr id="9" name="Straight Connector 8">
+            <a:extLst>
+              <a:ext uri="{FF2B5EF4-FFF2-40B4-BE49-F238E27FC236}">
+                <a16:creationId xmlns:a16="http://schemas.microsoft.com/office/drawing/2014/main" id="{6552516A-1301-4164-975D-5F266FE3A076}"/>
+              </a:ext>
+            </a:extLst>
+          </p:cNvPr>
+          <p:cNvCxnSpPr>
+            <a:cxnSpLocks/>
+          </p:cNvCxnSpPr>
+          <p:nvPr/>
+        </p:nvCxnSpPr>
+        <p:spPr>
+          <a:xfrm>
+            <a:off x="7079945" y="259966"/>
+            <a:ext cx="0" cy="5666587"/>
+          </a:xfrm>
+          <a:prstGeom prst="line">
+            <a:avLst/>
+          </a:prstGeom>
+          <a:ln>
+            <a:prstDash val="dashDot"/>
+          </a:ln>
+        </p:spPr>
+        <p:style>
+          <a:lnRef idx="1">
+            <a:schemeClr val="accent1"/>
+          </a:lnRef>
+          <a:fillRef idx="0">
+            <a:schemeClr val="accent1"/>
+          </a:fillRef>
+          <a:effectRef idx="0">
+            <a:schemeClr val="accent1"/>
+          </a:effectRef>
+          <a:fontRef idx="minor">
+            <a:schemeClr val="tx1"/>
+          </a:fontRef>
+        </p:style>
+      </p:cxnSp>
+      <p:cxnSp>
+        <p:nvCxnSpPr>
+          <p:cNvPr id="11" name="Straight Connector 10">
+            <a:extLst>
+              <a:ext uri="{FF2B5EF4-FFF2-40B4-BE49-F238E27FC236}">
+                <a16:creationId xmlns:a16="http://schemas.microsoft.com/office/drawing/2014/main" id="{C34F960F-1C6F-497A-B2AC-86810D70EE15}"/>
+              </a:ext>
+            </a:extLst>
+          </p:cNvPr>
+          <p:cNvCxnSpPr>
+            <a:cxnSpLocks/>
+          </p:cNvCxnSpPr>
+          <p:nvPr/>
+        </p:nvCxnSpPr>
+        <p:spPr>
+          <a:xfrm>
+            <a:off x="4376598" y="259966"/>
+            <a:ext cx="0" cy="5673655"/>
+          </a:xfrm>
+          <a:prstGeom prst="line">
+            <a:avLst/>
+          </a:prstGeom>
+          <a:ln>
+            <a:prstDash val="dashDot"/>
+          </a:ln>
+        </p:spPr>
+        <p:style>
+          <a:lnRef idx="1">
+            <a:schemeClr val="accent1"/>
+          </a:lnRef>
+          <a:fillRef idx="0">
+            <a:schemeClr val="accent1"/>
+          </a:fillRef>
+          <a:effectRef idx="0">
+            <a:schemeClr val="accent1"/>
+          </a:effectRef>
+          <a:fontRef idx="minor">
+            <a:schemeClr val="tx1"/>
+          </a:fontRef>
+        </p:style>
+      </p:cxnSp>
+      <p:cxnSp>
+        <p:nvCxnSpPr>
+          <p:cNvPr id="12" name="Straight Connector 11">
+            <a:extLst>
+              <a:ext uri="{FF2B5EF4-FFF2-40B4-BE49-F238E27FC236}">
+                <a16:creationId xmlns:a16="http://schemas.microsoft.com/office/drawing/2014/main" id="{966E707E-9B4E-49E8-A867-1B7176BCFD16}"/>
+              </a:ext>
+            </a:extLst>
+          </p:cNvPr>
+          <p:cNvCxnSpPr/>
+          <p:nvPr/>
+        </p:nvCxnSpPr>
+        <p:spPr>
+          <a:xfrm>
+            <a:off x="2771493" y="1951546"/>
+            <a:ext cx="5931017" cy="0"/>
+          </a:xfrm>
+          <a:prstGeom prst="line">
+            <a:avLst/>
+          </a:prstGeom>
+          <a:ln>
+            <a:prstDash val="dashDot"/>
+          </a:ln>
+        </p:spPr>
+        <p:style>
+          <a:lnRef idx="1">
+            <a:schemeClr val="accent1"/>
+          </a:lnRef>
+          <a:fillRef idx="0">
+            <a:schemeClr val="accent1"/>
+          </a:fillRef>
+          <a:effectRef idx="0">
+            <a:schemeClr val="accent1"/>
+          </a:effectRef>
+          <a:fontRef idx="minor">
+            <a:schemeClr val="tx1"/>
+          </a:fontRef>
+        </p:style>
+      </p:cxnSp>
+      <p:sp>
+        <p:nvSpPr>
+          <p:cNvPr id="13" name="TextBox 12">
+            <a:extLst>
+              <a:ext uri="{FF2B5EF4-FFF2-40B4-BE49-F238E27FC236}">
+                <a16:creationId xmlns:a16="http://schemas.microsoft.com/office/drawing/2014/main" id="{DC49E8B6-43EA-4AEC-86A4-30A97ACC4542}"/>
+              </a:ext>
+            </a:extLst>
+          </p:cNvPr>
+          <p:cNvSpPr txBox="1"/>
+          <p:nvPr/>
+        </p:nvSpPr>
+        <p:spPr>
+          <a:xfrm>
+            <a:off x="3640822" y="5813571"/>
+            <a:ext cx="562041" cy="369332"/>
+          </a:xfrm>
+          <a:prstGeom prst="rect">
+            <a:avLst/>
+          </a:prstGeom>
+          <a:noFill/>
+        </p:spPr>
+        <p:txBody>
+          <a:bodyPr wrap="square" rtlCol="0">
+            <a:spAutoFit/>
+          </a:bodyPr>
+          <a:lstStyle/>
+          <a:p>
+            <a:r>
+              <a:rPr lang="en-GB" dirty="0"/>
+              <a:t>1/4</a:t>
+            </a:r>
+          </a:p>
+        </p:txBody>
+      </p:sp>
+      <p:sp>
+        <p:nvSpPr>
+          <p:cNvPr id="14" name="TextBox 13">
+            <a:extLst>
+              <a:ext uri="{FF2B5EF4-FFF2-40B4-BE49-F238E27FC236}">
+                <a16:creationId xmlns:a16="http://schemas.microsoft.com/office/drawing/2014/main" id="{89265755-E219-470E-8A12-0ADB9075CD7C}"/>
+              </a:ext>
+            </a:extLst>
+          </p:cNvPr>
+          <p:cNvSpPr txBox="1"/>
+          <p:nvPr/>
+        </p:nvSpPr>
+        <p:spPr>
+          <a:xfrm>
+            <a:off x="4709211" y="5818069"/>
+            <a:ext cx="562041" cy="369332"/>
+          </a:xfrm>
+          <a:prstGeom prst="rect">
+            <a:avLst/>
+          </a:prstGeom>
+          <a:noFill/>
+        </p:spPr>
+        <p:txBody>
+          <a:bodyPr wrap="square" rtlCol="0">
+            <a:spAutoFit/>
+          </a:bodyPr>
+          <a:lstStyle/>
+          <a:p>
+            <a:r>
+              <a:rPr lang="en-GB" dirty="0"/>
+              <a:t>1/4</a:t>
+            </a:r>
+          </a:p>
+        </p:txBody>
+      </p:sp>
+      <p:sp>
+        <p:nvSpPr>
+          <p:cNvPr id="15" name="TextBox 14">
+            <a:extLst>
+              <a:ext uri="{FF2B5EF4-FFF2-40B4-BE49-F238E27FC236}">
+                <a16:creationId xmlns:a16="http://schemas.microsoft.com/office/drawing/2014/main" id="{6A7F9467-0D45-46AF-8857-B41E3187942A}"/>
+              </a:ext>
+            </a:extLst>
+          </p:cNvPr>
+          <p:cNvSpPr txBox="1"/>
+          <p:nvPr/>
+        </p:nvSpPr>
+        <p:spPr>
+          <a:xfrm>
+            <a:off x="7341766" y="5819255"/>
+            <a:ext cx="562041" cy="369332"/>
+          </a:xfrm>
+          <a:prstGeom prst="rect">
+            <a:avLst/>
+          </a:prstGeom>
+          <a:noFill/>
+        </p:spPr>
+        <p:txBody>
+          <a:bodyPr wrap="square" rtlCol="0">
+            <a:spAutoFit/>
+          </a:bodyPr>
+          <a:lstStyle/>
+          <a:p>
+            <a:r>
+              <a:rPr lang="en-GB" dirty="0"/>
+              <a:t>1/4</a:t>
+            </a:r>
+          </a:p>
+        </p:txBody>
+      </p:sp>
+      <p:sp>
+        <p:nvSpPr>
+          <p:cNvPr id="16" name="TextBox 15">
+            <a:extLst>
+              <a:ext uri="{FF2B5EF4-FFF2-40B4-BE49-F238E27FC236}">
+                <a16:creationId xmlns:a16="http://schemas.microsoft.com/office/drawing/2014/main" id="{36C63F56-B1C7-4BC4-B37F-38DF5468E097}"/>
+              </a:ext>
+            </a:extLst>
+          </p:cNvPr>
+          <p:cNvSpPr txBox="1"/>
+          <p:nvPr/>
+        </p:nvSpPr>
+        <p:spPr>
+          <a:xfrm>
+            <a:off x="2556750" y="2440588"/>
+            <a:ext cx="562041" cy="369332"/>
+          </a:xfrm>
+          <a:prstGeom prst="rect">
+            <a:avLst/>
+          </a:prstGeom>
+          <a:noFill/>
+        </p:spPr>
+        <p:txBody>
+          <a:bodyPr wrap="square" rtlCol="0">
+            <a:spAutoFit/>
+          </a:bodyPr>
+          <a:lstStyle/>
+          <a:p>
+            <a:r>
+              <a:rPr lang="en-GB" dirty="0"/>
+              <a:t>1/4</a:t>
+            </a:r>
+          </a:p>
+        </p:txBody>
+      </p:sp>
+      <p:sp>
+        <p:nvSpPr>
+          <p:cNvPr id="17" name="TextBox 16">
+            <a:extLst>
+              <a:ext uri="{FF2B5EF4-FFF2-40B4-BE49-F238E27FC236}">
+                <a16:creationId xmlns:a16="http://schemas.microsoft.com/office/drawing/2014/main" id="{78C050D0-6399-4613-8C3E-6A2A139DA432}"/>
+              </a:ext>
+            </a:extLst>
+          </p:cNvPr>
+          <p:cNvSpPr txBox="1"/>
+          <p:nvPr/>
+        </p:nvSpPr>
+        <p:spPr>
+          <a:xfrm>
+            <a:off x="2516696" y="4904371"/>
+            <a:ext cx="541078" cy="369332"/>
+          </a:xfrm>
+          <a:prstGeom prst="rect">
+            <a:avLst/>
+          </a:prstGeom>
+          <a:noFill/>
+        </p:spPr>
+        <p:txBody>
+          <a:bodyPr wrap="square" rtlCol="0">
+            <a:spAutoFit/>
+          </a:bodyPr>
+          <a:lstStyle/>
+          <a:p>
+            <a:r>
+              <a:rPr lang="en-GB" dirty="0"/>
+              <a:t>1/4</a:t>
+            </a:r>
+          </a:p>
+        </p:txBody>
+      </p:sp>
+      <p:sp>
+        <p:nvSpPr>
+          <p:cNvPr id="18" name="TextBox 17">
+            <a:extLst>
+              <a:ext uri="{FF2B5EF4-FFF2-40B4-BE49-F238E27FC236}">
+                <a16:creationId xmlns:a16="http://schemas.microsoft.com/office/drawing/2014/main" id="{483865DF-C466-4D57-AE49-C68A2BE03BA2}"/>
+              </a:ext>
+            </a:extLst>
+          </p:cNvPr>
+          <p:cNvSpPr txBox="1"/>
+          <p:nvPr/>
+        </p:nvSpPr>
+        <p:spPr>
+          <a:xfrm>
+            <a:off x="2554816" y="1022021"/>
+            <a:ext cx="562041" cy="369332"/>
+          </a:xfrm>
+          <a:prstGeom prst="rect">
+            <a:avLst/>
+          </a:prstGeom>
+          <a:noFill/>
+        </p:spPr>
+        <p:txBody>
+          <a:bodyPr wrap="square" rtlCol="0">
+            <a:spAutoFit/>
+          </a:bodyPr>
+          <a:lstStyle/>
+          <a:p>
+            <a:r>
+              <a:rPr lang="en-GB" dirty="0"/>
+              <a:t>1/4</a:t>
+            </a:r>
+          </a:p>
+        </p:txBody>
+      </p:sp>
+      <p:sp>
+        <p:nvSpPr>
+          <p:cNvPr id="20" name="Oval 19">
+            <a:extLst>
+              <a:ext uri="{FF2B5EF4-FFF2-40B4-BE49-F238E27FC236}">
+                <a16:creationId xmlns:a16="http://schemas.microsoft.com/office/drawing/2014/main" id="{197B5477-4032-4CCC-A0A5-337A43C3457B}"/>
+              </a:ext>
+            </a:extLst>
+          </p:cNvPr>
+          <p:cNvSpPr/>
+          <p:nvPr/>
+        </p:nvSpPr>
+        <p:spPr>
+          <a:xfrm>
+            <a:off x="5433260" y="2943364"/>
+            <a:ext cx="443883" cy="443883"/>
+          </a:xfrm>
+          <a:prstGeom prst="ellipse">
+            <a:avLst/>
+          </a:prstGeom>
+          <a:solidFill>
+            <a:schemeClr val="tx1"/>
+          </a:solidFill>
+        </p:spPr>
+        <p:style>
+          <a:lnRef idx="2">
+            <a:schemeClr val="accent1">
+              <a:shade val="50000"/>
+            </a:schemeClr>
+          </a:lnRef>
+          <a:fillRef idx="1">
+            <a:schemeClr val="accent1"/>
+          </a:fillRef>
+          <a:effectRef idx="0">
+            <a:schemeClr val="accent1"/>
+          </a:effectRef>
+          <a:fontRef idx="minor">
+            <a:schemeClr val="lt1"/>
+          </a:fontRef>
+        </p:style>
+        <p:txBody>
+          <a:bodyPr rtlCol="0" anchor="ctr"/>
+          <a:lstStyle/>
+          <a:p>
+            <a:pPr algn="ctr"/>
+            <a:r>
+              <a:rPr lang="en-GB" dirty="0"/>
+              <a:t>5</a:t>
+            </a:r>
+          </a:p>
+        </p:txBody>
+      </p:sp>
+      <p:sp>
+        <p:nvSpPr>
+          <p:cNvPr id="21" name="Oval 20">
+            <a:extLst>
+              <a:ext uri="{FF2B5EF4-FFF2-40B4-BE49-F238E27FC236}">
+                <a16:creationId xmlns:a16="http://schemas.microsoft.com/office/drawing/2014/main" id="{D8B42E1F-A58C-45C7-A80B-CDEDEFA99308}"/>
+              </a:ext>
+            </a:extLst>
+          </p:cNvPr>
+          <p:cNvSpPr/>
+          <p:nvPr/>
+        </p:nvSpPr>
+        <p:spPr>
+          <a:xfrm>
+            <a:off x="4154657" y="2927289"/>
+            <a:ext cx="443883" cy="443883"/>
+          </a:xfrm>
+          <a:prstGeom prst="ellipse">
+            <a:avLst/>
+          </a:prstGeom>
+          <a:solidFill>
+            <a:schemeClr val="tx1"/>
+          </a:solidFill>
+        </p:spPr>
+        <p:style>
+          <a:lnRef idx="2">
+            <a:schemeClr val="accent1">
+              <a:shade val="50000"/>
+            </a:schemeClr>
+          </a:lnRef>
+          <a:fillRef idx="1">
+            <a:schemeClr val="accent1"/>
+          </a:fillRef>
+          <a:effectRef idx="0">
+            <a:schemeClr val="accent1"/>
+          </a:effectRef>
+          <a:fontRef idx="minor">
+            <a:schemeClr val="lt1"/>
+          </a:fontRef>
+        </p:style>
+        <p:txBody>
+          <a:bodyPr rtlCol="0" anchor="ctr"/>
+          <a:lstStyle/>
+          <a:p>
+            <a:pPr algn="ctr"/>
+            <a:r>
+              <a:rPr lang="en-GB" dirty="0"/>
+              <a:t>4</a:t>
+            </a:r>
+          </a:p>
+        </p:txBody>
+      </p:sp>
+      <p:sp>
+        <p:nvSpPr>
+          <p:cNvPr id="22" name="Oval 21">
+            <a:extLst>
+              <a:ext uri="{FF2B5EF4-FFF2-40B4-BE49-F238E27FC236}">
+                <a16:creationId xmlns:a16="http://schemas.microsoft.com/office/drawing/2014/main" id="{6CEF6E7C-835D-4534-A53C-2219D53610AD}"/>
+              </a:ext>
+            </a:extLst>
+          </p:cNvPr>
+          <p:cNvSpPr/>
+          <p:nvPr/>
+        </p:nvSpPr>
+        <p:spPr>
+          <a:xfrm>
+            <a:off x="6897883" y="1702223"/>
+            <a:ext cx="443883" cy="443883"/>
+          </a:xfrm>
+          <a:prstGeom prst="ellipse">
+            <a:avLst/>
+          </a:prstGeom>
+          <a:solidFill>
+            <a:schemeClr val="tx1"/>
+          </a:solidFill>
+        </p:spPr>
+        <p:style>
+          <a:lnRef idx="2">
+            <a:schemeClr val="accent1">
+              <a:shade val="50000"/>
+            </a:schemeClr>
+          </a:lnRef>
+          <a:fillRef idx="1">
+            <a:schemeClr val="accent1"/>
+          </a:fillRef>
+          <a:effectRef idx="0">
+            <a:schemeClr val="accent1"/>
+          </a:effectRef>
+          <a:fontRef idx="minor">
+            <a:schemeClr val="lt1"/>
+          </a:fontRef>
+        </p:style>
+        <p:txBody>
+          <a:bodyPr rtlCol="0" anchor="ctr"/>
+          <a:lstStyle/>
+          <a:p>
+            <a:pPr algn="ctr"/>
+            <a:r>
+              <a:rPr lang="en-GB" dirty="0"/>
+              <a:t>9</a:t>
+            </a:r>
+          </a:p>
+        </p:txBody>
+      </p:sp>
+      <p:sp>
+        <p:nvSpPr>
+          <p:cNvPr id="23" name="Oval 22">
+            <a:extLst>
+              <a:ext uri="{FF2B5EF4-FFF2-40B4-BE49-F238E27FC236}">
+                <a16:creationId xmlns:a16="http://schemas.microsoft.com/office/drawing/2014/main" id="{D6E7412A-939D-48CB-AE8B-DFA1B5EEA592}"/>
+              </a:ext>
+            </a:extLst>
+          </p:cNvPr>
+          <p:cNvSpPr/>
+          <p:nvPr/>
+        </p:nvSpPr>
+        <p:spPr>
+          <a:xfrm>
+            <a:off x="5475995" y="1702223"/>
+            <a:ext cx="443883" cy="443883"/>
+          </a:xfrm>
+          <a:prstGeom prst="ellipse">
+            <a:avLst/>
+          </a:prstGeom>
+          <a:solidFill>
+            <a:schemeClr val="tx1"/>
+          </a:solidFill>
+        </p:spPr>
+        <p:style>
+          <a:lnRef idx="2">
+            <a:schemeClr val="accent1">
+              <a:shade val="50000"/>
+            </a:schemeClr>
+          </a:lnRef>
+          <a:fillRef idx="1">
+            <a:schemeClr val="accent1"/>
+          </a:fillRef>
+          <a:effectRef idx="0">
+            <a:schemeClr val="accent1"/>
+          </a:effectRef>
+          <a:fontRef idx="minor">
+            <a:schemeClr val="lt1"/>
+          </a:fontRef>
+        </p:style>
+        <p:txBody>
+          <a:bodyPr rtlCol="0" anchor="ctr"/>
+          <a:lstStyle/>
+          <a:p>
+            <a:pPr algn="ctr"/>
+            <a:r>
+              <a:rPr lang="en-GB" dirty="0"/>
+              <a:t>8</a:t>
+            </a:r>
+          </a:p>
+        </p:txBody>
+      </p:sp>
+      <p:sp>
+        <p:nvSpPr>
+          <p:cNvPr id="24" name="Oval 23">
+            <a:extLst>
+              <a:ext uri="{FF2B5EF4-FFF2-40B4-BE49-F238E27FC236}">
+                <a16:creationId xmlns:a16="http://schemas.microsoft.com/office/drawing/2014/main" id="{4FC8C510-C4EA-423F-8F67-45E75C95EFC5}"/>
+              </a:ext>
+            </a:extLst>
+          </p:cNvPr>
+          <p:cNvSpPr/>
+          <p:nvPr/>
+        </p:nvSpPr>
+        <p:spPr>
+          <a:xfrm>
+            <a:off x="4154657" y="1736151"/>
+            <a:ext cx="443883" cy="443883"/>
+          </a:xfrm>
+          <a:prstGeom prst="ellipse">
+            <a:avLst/>
+          </a:prstGeom>
+          <a:solidFill>
+            <a:schemeClr val="tx1"/>
+          </a:solidFill>
+        </p:spPr>
+        <p:style>
+          <a:lnRef idx="2">
+            <a:schemeClr val="accent1">
+              <a:shade val="50000"/>
+            </a:schemeClr>
+          </a:lnRef>
+          <a:fillRef idx="1">
+            <a:schemeClr val="accent1"/>
+          </a:fillRef>
+          <a:effectRef idx="0">
+            <a:schemeClr val="accent1"/>
+          </a:effectRef>
+          <a:fontRef idx="minor">
+            <a:schemeClr val="lt1"/>
+          </a:fontRef>
+        </p:style>
+        <p:txBody>
+          <a:bodyPr rtlCol="0" anchor="ctr"/>
+          <a:lstStyle/>
+          <a:p>
+            <a:pPr algn="ctr"/>
+            <a:r>
+              <a:rPr lang="en-GB" dirty="0"/>
+              <a:t>7</a:t>
+            </a:r>
+          </a:p>
+        </p:txBody>
+      </p:sp>
+      <p:cxnSp>
+        <p:nvCxnSpPr>
+          <p:cNvPr id="25" name="Straight Connector 24">
+            <a:extLst>
+              <a:ext uri="{FF2B5EF4-FFF2-40B4-BE49-F238E27FC236}">
+                <a16:creationId xmlns:a16="http://schemas.microsoft.com/office/drawing/2014/main" id="{D07B5452-843A-446D-9F3E-39D6E341DCBA}"/>
+              </a:ext>
+            </a:extLst>
+          </p:cNvPr>
+          <p:cNvCxnSpPr/>
+          <p:nvPr/>
+        </p:nvCxnSpPr>
+        <p:spPr>
+          <a:xfrm>
+            <a:off x="2771494" y="3212891"/>
+            <a:ext cx="5931017" cy="0"/>
+          </a:xfrm>
+          <a:prstGeom prst="line">
+            <a:avLst/>
+          </a:prstGeom>
+          <a:ln>
+            <a:prstDash val="dashDot"/>
+          </a:ln>
+        </p:spPr>
+        <p:style>
+          <a:lnRef idx="1">
+            <a:schemeClr val="accent1"/>
+          </a:lnRef>
+          <a:fillRef idx="0">
+            <a:schemeClr val="accent1"/>
+          </a:fillRef>
+          <a:effectRef idx="0">
+            <a:schemeClr val="accent1"/>
+          </a:effectRef>
+          <a:fontRef idx="minor">
+            <a:schemeClr val="tx1"/>
+          </a:fontRef>
+        </p:style>
+      </p:cxnSp>
+      <p:cxnSp>
+        <p:nvCxnSpPr>
+          <p:cNvPr id="27" name="Straight Connector 26">
+            <a:extLst>
+              <a:ext uri="{FF2B5EF4-FFF2-40B4-BE49-F238E27FC236}">
+                <a16:creationId xmlns:a16="http://schemas.microsoft.com/office/drawing/2014/main" id="{B5ABD109-53FF-4E7C-A2A6-F6BEA55A499F}"/>
+              </a:ext>
+            </a:extLst>
+          </p:cNvPr>
+          <p:cNvCxnSpPr>
+            <a:cxnSpLocks/>
+          </p:cNvCxnSpPr>
+          <p:nvPr/>
+        </p:nvCxnSpPr>
+        <p:spPr>
+          <a:xfrm flipH="1">
+            <a:off x="5655201" y="259966"/>
+            <a:ext cx="27981" cy="5673655"/>
+          </a:xfrm>
+          <a:prstGeom prst="line">
+            <a:avLst/>
+          </a:prstGeom>
+          <a:ln>
+            <a:prstDash val="dashDot"/>
+          </a:ln>
+        </p:spPr>
+        <p:style>
+          <a:lnRef idx="1">
+            <a:schemeClr val="accent1"/>
+          </a:lnRef>
+          <a:fillRef idx="0">
+            <a:schemeClr val="accent1"/>
+          </a:fillRef>
+          <a:effectRef idx="0">
+            <a:schemeClr val="accent1"/>
+          </a:effectRef>
+          <a:fontRef idx="minor">
+            <a:schemeClr val="tx1"/>
+          </a:fontRef>
+        </p:style>
+      </p:cxnSp>
+      <p:sp>
+        <p:nvSpPr>
+          <p:cNvPr id="28" name="TextBox 27">
+            <a:extLst>
+              <a:ext uri="{FF2B5EF4-FFF2-40B4-BE49-F238E27FC236}">
+                <a16:creationId xmlns:a16="http://schemas.microsoft.com/office/drawing/2014/main" id="{09369B57-20AD-4762-8936-EE23C3E79037}"/>
+              </a:ext>
+            </a:extLst>
+          </p:cNvPr>
+          <p:cNvSpPr txBox="1"/>
+          <p:nvPr/>
+        </p:nvSpPr>
+        <p:spPr>
+          <a:xfrm>
+            <a:off x="6066672" y="5813571"/>
+            <a:ext cx="562041" cy="369332"/>
+          </a:xfrm>
+          <a:prstGeom prst="rect">
+            <a:avLst/>
+          </a:prstGeom>
+          <a:noFill/>
+        </p:spPr>
+        <p:txBody>
+          <a:bodyPr wrap="square" rtlCol="0">
+            <a:spAutoFit/>
+          </a:bodyPr>
+          <a:lstStyle/>
+          <a:p>
+            <a:r>
+              <a:rPr lang="en-GB" dirty="0"/>
+              <a:t>1/4</a:t>
+            </a:r>
+          </a:p>
+        </p:txBody>
+      </p:sp>
+      <p:sp>
+        <p:nvSpPr>
+          <p:cNvPr id="29" name="TextBox 28">
+            <a:extLst>
+              <a:ext uri="{FF2B5EF4-FFF2-40B4-BE49-F238E27FC236}">
+                <a16:creationId xmlns:a16="http://schemas.microsoft.com/office/drawing/2014/main" id="{8C16DAC7-880F-4B71-BB16-3C4E3DB4F329}"/>
+              </a:ext>
+            </a:extLst>
+          </p:cNvPr>
+          <p:cNvSpPr txBox="1"/>
+          <p:nvPr/>
+        </p:nvSpPr>
+        <p:spPr>
+          <a:xfrm>
+            <a:off x="2554817" y="3584521"/>
+            <a:ext cx="562041" cy="369332"/>
+          </a:xfrm>
+          <a:prstGeom prst="rect">
+            <a:avLst/>
+          </a:prstGeom>
+          <a:noFill/>
+        </p:spPr>
+        <p:txBody>
+          <a:bodyPr wrap="square" rtlCol="0">
+            <a:spAutoFit/>
+          </a:bodyPr>
+          <a:lstStyle/>
+          <a:p>
+            <a:r>
+              <a:rPr lang="en-GB" dirty="0"/>
+              <a:t>1/4</a:t>
+            </a:r>
+          </a:p>
+        </p:txBody>
+      </p:sp>
+    </p:spTree>
+    <p:extLst>
+      <p:ext uri="{BB962C8B-B14F-4D97-AF65-F5344CB8AC3E}">
+        <p14:creationId xmlns:p14="http://schemas.microsoft.com/office/powerpoint/2010/main" val="1744435290"/>
+      </p:ext>
+    </p:extLst>
+  </p:cSld>
+  <p:clrMapOvr>
+    <a:masterClrMapping/>
+  </p:clrMapOvr>
+</p:sld>
+</file>
+
+<file path=ppt/slides/slide7.xml><?xml version="1.0" encoding="utf-8"?>
+<p:sld xmlns:a="http://schemas.openxmlformats.org/drawingml/2006/main" xmlns:r="http://schemas.openxmlformats.org/officeDocument/2006/relationships" xmlns:p="http://schemas.openxmlformats.org/presentationml/2006/main">
+  <p:cSld>
+    <p:spTree>
+      <p:nvGrpSpPr>
+        <p:cNvPr id="1" name=""/>
+        <p:cNvGrpSpPr/>
+        <p:nvPr/>
+      </p:nvGrpSpPr>
+      <p:grpSpPr>
+        <a:xfrm>
+          <a:off x="0" y="0"/>
+          <a:ext cx="0" cy="0"/>
+          <a:chOff x="0" y="0"/>
+          <a:chExt cx="0" cy="0"/>
+        </a:xfrm>
+      </p:grpSpPr>
+      <mc:AlternateContent xmlns:mc="http://schemas.openxmlformats.org/markup-compatibility/2006">
+        <mc:Choice xmlns:a14="http://schemas.microsoft.com/office/drawing/2010/main" Requires="a14">
+          <p:sp>
+            <p:nvSpPr>
+              <p:cNvPr id="2" name="TextBox 1">
+                <a:extLst>
+                  <a:ext uri="{FF2B5EF4-FFF2-40B4-BE49-F238E27FC236}">
+                    <a16:creationId xmlns:a16="http://schemas.microsoft.com/office/drawing/2014/main" id="{0647E7A2-6388-4410-B89D-09D7694DD6CC}"/>
+                  </a:ext>
+                </a:extLst>
+              </p:cNvPr>
+              <p:cNvSpPr txBox="1"/>
+              <p:nvPr/>
+            </p:nvSpPr>
+            <p:spPr>
+              <a:xfrm>
+                <a:off x="1308683" y="2491530"/>
+                <a:ext cx="7709482" cy="572336"/>
+              </a:xfrm>
+              <a:prstGeom prst="rect">
+                <a:avLst/>
+              </a:prstGeom>
+              <a:noFill/>
+            </p:spPr>
+            <p:txBody>
+              <a:bodyPr wrap="square" lIns="0" tIns="0" rIns="0" bIns="0" rtlCol="0">
+                <a:spAutoFit/>
+              </a:bodyPr>
+              <a:lstStyle/>
+              <a:p>
+                <a14:m>
+                  <m:oMathPara xmlns:m="http://schemas.openxmlformats.org/officeDocument/2006/math">
+                    <m:oMathParaPr>
+                      <m:jc m:val="centerGroup"/>
+                    </m:oMathParaPr>
+                    <m:oMath xmlns:m="http://schemas.openxmlformats.org/officeDocument/2006/math">
+                      <m:r>
+                        <a:rPr lang="en-GB" b="0" i="1" smtClean="0">
+                          <a:latin typeface="Cambria Math" panose="02040503050406030204" pitchFamily="18" charset="0"/>
+                        </a:rPr>
+                        <m:t>𝑚𝑒𝑎𝑛</m:t>
+                      </m:r>
+                      <m:r>
+                        <a:rPr lang="en-GB" b="0" i="1" smtClean="0">
+                          <a:latin typeface="Cambria Math" panose="02040503050406030204" pitchFamily="18" charset="0"/>
+                        </a:rPr>
+                        <m:t> </m:t>
+                      </m:r>
+                      <m:r>
+                        <a:rPr lang="en-GB" b="0" i="1" smtClean="0">
+                          <a:latin typeface="Cambria Math" panose="02040503050406030204" pitchFamily="18" charset="0"/>
+                        </a:rPr>
+                        <m:t>𝑛𝑒𝑎𝑟𝑒𝑠𝑡</m:t>
+                      </m:r>
+                      <m:r>
+                        <a:rPr lang="en-GB" b="0" i="1" smtClean="0">
+                          <a:latin typeface="Cambria Math" panose="02040503050406030204" pitchFamily="18" charset="0"/>
+                        </a:rPr>
+                        <m:t> </m:t>
+                      </m:r>
+                      <m:r>
+                        <a:rPr lang="en-GB" b="0" i="1" smtClean="0">
+                          <a:latin typeface="Cambria Math" panose="02040503050406030204" pitchFamily="18" charset="0"/>
+                        </a:rPr>
+                        <m:t>𝑛𝑒𝑖𝑔h𝑏𝑜𝑢𝑟</m:t>
+                      </m:r>
+                      <m:r>
+                        <a:rPr lang="en-GB" b="0" i="1" smtClean="0">
+                          <a:latin typeface="Cambria Math" panose="02040503050406030204" pitchFamily="18" charset="0"/>
+                        </a:rPr>
+                        <m:t> </m:t>
+                      </m:r>
+                      <m:r>
+                        <a:rPr lang="en-GB" b="0" i="1" smtClean="0">
+                          <a:latin typeface="Cambria Math" panose="02040503050406030204" pitchFamily="18" charset="0"/>
+                        </a:rPr>
+                        <m:t>𝑑𝑖𝑠𝑡𝑎𝑛𝑐𝑒</m:t>
+                      </m:r>
+                      <m:r>
+                        <a:rPr lang="en-GB" b="0" i="1" smtClean="0">
+                          <a:latin typeface="Cambria Math" panose="02040503050406030204" pitchFamily="18" charset="0"/>
+                        </a:rPr>
+                        <m:t>(</m:t>
+                      </m:r>
+                      <m:r>
+                        <a:rPr lang="en-GB" b="0" i="1" smtClean="0">
+                          <a:latin typeface="Cambria Math" panose="02040503050406030204" pitchFamily="18" charset="0"/>
+                        </a:rPr>
+                        <m:t>𝑛</m:t>
+                      </m:r>
+                      <m:r>
+                        <a:rPr lang="en-GB" b="0" i="1" smtClean="0">
+                          <a:latin typeface="Cambria Math" panose="02040503050406030204" pitchFamily="18" charset="0"/>
+                        </a:rPr>
+                        <m:t>)=</m:t>
+                      </m:r>
+                      <m:f>
+                        <m:fPr>
+                          <m:ctrlPr>
+                            <a:rPr lang="en-US" i="1" smtClean="0">
+                              <a:latin typeface="Cambria Math" panose="02040503050406030204" pitchFamily="18" charset="0"/>
+                            </a:rPr>
+                          </m:ctrlPr>
+                        </m:fPr>
+                        <m:num>
+                          <m:r>
+                            <a:rPr lang="en-GB" b="0" i="1" smtClean="0">
+                              <a:latin typeface="Cambria Math" panose="02040503050406030204" pitchFamily="18" charset="0"/>
+                            </a:rPr>
+                            <m:t>1</m:t>
+                          </m:r>
+                        </m:num>
+                        <m:den>
+                          <m:rad>
+                            <m:radPr>
+                              <m:degHide m:val="on"/>
+                              <m:ctrlPr>
+                                <a:rPr lang="en-US" i="1">
+                                  <a:latin typeface="Cambria Math" panose="02040503050406030204" pitchFamily="18" charset="0"/>
+                                </a:rPr>
+                              </m:ctrlPr>
+                            </m:radPr>
+                            <m:deg/>
+                            <m:e>
+                              <m:r>
+                                <a:rPr lang="en-GB" b="0" i="1" smtClean="0">
+                                  <a:latin typeface="Cambria Math" panose="02040503050406030204" pitchFamily="18" charset="0"/>
+                                </a:rPr>
+                                <m:t>𝑛</m:t>
+                              </m:r>
+                            </m:e>
+                          </m:rad>
+                          <m:r>
+                            <a:rPr lang="en-GB" b="0" i="1" smtClean="0">
+                              <a:latin typeface="Cambria Math" panose="02040503050406030204" pitchFamily="18" charset="0"/>
+                            </a:rPr>
+                            <m:t>+1</m:t>
+                          </m:r>
+                        </m:den>
+                      </m:f>
+                    </m:oMath>
+                  </m:oMathPara>
+                </a14:m>
+                <a:endParaRPr lang="en-GB" dirty="0"/>
+              </a:p>
+            </p:txBody>
+          </p:sp>
+        </mc:Choice>
+        <mc:Fallback>
+          <p:sp>
+            <p:nvSpPr>
+              <p:cNvPr id="2" name="TextBox 1">
+                <a:extLst>
+                  <a:ext uri="{FF2B5EF4-FFF2-40B4-BE49-F238E27FC236}">
+                    <a16:creationId xmlns:a16="http://schemas.microsoft.com/office/drawing/2014/main" id="{0647E7A2-6388-4410-B89D-09D7694DD6CC}"/>
+                  </a:ext>
+                </a:extLst>
+              </p:cNvPr>
+              <p:cNvSpPr txBox="1">
+                <a:spLocks noRot="1" noChangeAspect="1" noMove="1" noResize="1" noEditPoints="1" noAdjustHandles="1" noChangeArrowheads="1" noChangeShapeType="1" noTextEdit="1"/>
+              </p:cNvSpPr>
+              <p:nvPr/>
+            </p:nvSpPr>
+            <p:spPr>
+              <a:xfrm>
+                <a:off x="1308683" y="2491530"/>
+                <a:ext cx="7709482" cy="572336"/>
+              </a:xfrm>
+              <a:prstGeom prst="rect">
+                <a:avLst/>
+              </a:prstGeom>
+              <a:blipFill>
+                <a:blip r:embed="rId2"/>
+                <a:stretch>
+                  <a:fillRect/>
+                </a:stretch>
+              </a:blipFill>
+            </p:spPr>
+            <p:txBody>
+              <a:bodyPr/>
+              <a:lstStyle/>
+              <a:p>
+                <a:r>
+                  <a:rPr lang="en-GB">
+                    <a:noFill/>
+                  </a:rPr>
+                  <a:t> </a:t>
+                </a:r>
+              </a:p>
+            </p:txBody>
+          </p:sp>
+        </mc:Fallback>
+      </mc:AlternateContent>
+    </p:spTree>
+    <p:extLst>
+      <p:ext uri="{BB962C8B-B14F-4D97-AF65-F5344CB8AC3E}">
+        <p14:creationId xmlns:p14="http://schemas.microsoft.com/office/powerpoint/2010/main" val="3375614515"/>
+      </p:ext>
+    </p:extLst>
+  </p:cSld>
+  <p:clrMapOvr>
+    <a:masterClrMapping/>
+  </p:clrMapOvr>
+</p:sld>
+</file>
+
 <file path=ppt/theme/theme1.xml><?xml version="1.0" encoding="utf-8"?>
 <a:theme xmlns:a="http://schemas.openxmlformats.org/drawingml/2006/main" name="Office Theme">
   <a:themeElements>

</xml_diff>

<commit_message>
Added Axes titles for matplotlib
</commit_message>
<xml_diff>
--- a/nne_distribution/Presentation1.pptx
+++ b/nne_distribution/Presentation1.pptx
@@ -12,6 +12,7 @@
     <p:sldId id="260" r:id="rId6"/>
     <p:sldId id="261" r:id="rId7"/>
     <p:sldId id="262" r:id="rId8"/>
+    <p:sldId id="263" r:id="rId9"/>
   </p:sldIdLst>
   <p:sldSz cx="12192000" cy="6858000"/>
   <p:notesSz cx="6858000" cy="9144000"/>
@@ -6518,6 +6519,96 @@
 </p:sld>
 </file>
 
+<file path=ppt/slides/slide8.xml><?xml version="1.0" encoding="utf-8"?>
+<p:sld xmlns:a="http://schemas.openxmlformats.org/drawingml/2006/main" xmlns:r="http://schemas.openxmlformats.org/officeDocument/2006/relationships" xmlns:p="http://schemas.openxmlformats.org/presentationml/2006/main">
+  <p:cSld>
+    <p:spTree>
+      <p:nvGrpSpPr>
+        <p:cNvPr id="1" name=""/>
+        <p:cNvGrpSpPr/>
+        <p:nvPr/>
+      </p:nvGrpSpPr>
+      <p:grpSpPr>
+        <a:xfrm>
+          <a:off x="0" y="0"/>
+          <a:ext cx="0" cy="0"/>
+          <a:chOff x="0" y="0"/>
+          <a:chExt cx="0" cy="0"/>
+        </a:xfrm>
+      </p:grpSpPr>
+      <p:pic>
+        <p:nvPicPr>
+          <p:cNvPr id="3" name="Picture 2">
+            <a:extLst>
+              <a:ext uri="{FF2B5EF4-FFF2-40B4-BE49-F238E27FC236}">
+                <a16:creationId xmlns:a16="http://schemas.microsoft.com/office/drawing/2014/main" id="{DB0AB03C-D968-497F-9231-7A92D348CEBF}"/>
+              </a:ext>
+            </a:extLst>
+          </p:cNvPr>
+          <p:cNvPicPr>
+            <a:picLocks noChangeAspect="1"/>
+          </p:cNvPicPr>
+          <p:nvPr/>
+        </p:nvPicPr>
+        <p:blipFill>
+          <a:blip r:embed="rId2"/>
+          <a:stretch>
+            <a:fillRect/>
+          </a:stretch>
+        </p:blipFill>
+        <p:spPr>
+          <a:xfrm>
+            <a:off x="2600587" y="100026"/>
+            <a:ext cx="5972961" cy="3204245"/>
+          </a:xfrm>
+          <a:prstGeom prst="rect">
+            <a:avLst/>
+          </a:prstGeom>
+        </p:spPr>
+      </p:pic>
+      <p:pic>
+        <p:nvPicPr>
+          <p:cNvPr id="5" name="Picture 4">
+            <a:extLst>
+              <a:ext uri="{FF2B5EF4-FFF2-40B4-BE49-F238E27FC236}">
+                <a16:creationId xmlns:a16="http://schemas.microsoft.com/office/drawing/2014/main" id="{6A7BF762-4DD1-4C45-90B6-94724482898A}"/>
+              </a:ext>
+            </a:extLst>
+          </p:cNvPr>
+          <p:cNvPicPr>
+            <a:picLocks noChangeAspect="1"/>
+          </p:cNvPicPr>
+          <p:nvPr/>
+        </p:nvPicPr>
+        <p:blipFill>
+          <a:blip r:embed="rId3"/>
+          <a:stretch>
+            <a:fillRect/>
+          </a:stretch>
+        </p:blipFill>
+        <p:spPr>
+          <a:xfrm>
+            <a:off x="2600587" y="3553729"/>
+            <a:ext cx="5972961" cy="3204245"/>
+          </a:xfrm>
+          <a:prstGeom prst="rect">
+            <a:avLst/>
+          </a:prstGeom>
+        </p:spPr>
+      </p:pic>
+    </p:spTree>
+    <p:extLst>
+      <p:ext uri="{BB962C8B-B14F-4D97-AF65-F5344CB8AC3E}">
+        <p14:creationId xmlns:p14="http://schemas.microsoft.com/office/powerpoint/2010/main" val="286799405"/>
+      </p:ext>
+    </p:extLst>
+  </p:cSld>
+  <p:clrMapOvr>
+    <a:masterClrMapping/>
+  </p:clrMapOvr>
+</p:sld>
+</file>
+
 <file path=ppt/theme/theme1.xml><?xml version="1.0" encoding="utf-8"?>
 <a:theme xmlns:a="http://schemas.openxmlformats.org/drawingml/2006/main" name="Office Theme">
   <a:themeElements>

</xml_diff>